<commit_message>
Introduction the suggested corrections
</commit_message>
<xml_diff>
--- a/prezentacja-AI.pptx
+++ b/prezentacja-AI.pptx
@@ -4,26 +4,35 @@
   <p:sldMasterIdLst>
     <p:sldMasterId id="2147483687" r:id="rId1"/>
   </p:sldMasterIdLst>
+  <p:notesMasterIdLst>
+    <p:notesMasterId r:id="rId27"/>
+  </p:notesMasterIdLst>
   <p:sldIdLst>
     <p:sldId id="266" r:id="rId2"/>
-    <p:sldId id="265" r:id="rId3"/>
-    <p:sldId id="270" r:id="rId4"/>
-    <p:sldId id="271" r:id="rId5"/>
-    <p:sldId id="267" r:id="rId6"/>
-    <p:sldId id="269" r:id="rId7"/>
-    <p:sldId id="272" r:id="rId8"/>
-    <p:sldId id="268" r:id="rId9"/>
-    <p:sldId id="256" r:id="rId10"/>
-    <p:sldId id="257" r:id="rId11"/>
-    <p:sldId id="258" r:id="rId12"/>
-    <p:sldId id="259" r:id="rId13"/>
-    <p:sldId id="260" r:id="rId14"/>
-    <p:sldId id="261" r:id="rId15"/>
-    <p:sldId id="262" r:id="rId16"/>
-    <p:sldId id="263" r:id="rId17"/>
-    <p:sldId id="264" r:id="rId18"/>
-    <p:sldId id="273" r:id="rId19"/>
-    <p:sldId id="274" r:id="rId20"/>
+    <p:sldId id="275" r:id="rId3"/>
+    <p:sldId id="276" r:id="rId4"/>
+    <p:sldId id="277" r:id="rId5"/>
+    <p:sldId id="278" r:id="rId6"/>
+    <p:sldId id="280" r:id="rId7"/>
+    <p:sldId id="279" r:id="rId8"/>
+    <p:sldId id="265" r:id="rId9"/>
+    <p:sldId id="270" r:id="rId10"/>
+    <p:sldId id="271" r:id="rId11"/>
+    <p:sldId id="267" r:id="rId12"/>
+    <p:sldId id="269" r:id="rId13"/>
+    <p:sldId id="268" r:id="rId14"/>
+    <p:sldId id="272" r:id="rId15"/>
+    <p:sldId id="256" r:id="rId16"/>
+    <p:sldId id="257" r:id="rId17"/>
+    <p:sldId id="258" r:id="rId18"/>
+    <p:sldId id="259" r:id="rId19"/>
+    <p:sldId id="260" r:id="rId20"/>
+    <p:sldId id="261" r:id="rId21"/>
+    <p:sldId id="262" r:id="rId22"/>
+    <p:sldId id="263" r:id="rId23"/>
+    <p:sldId id="264" r:id="rId24"/>
+    <p:sldId id="273" r:id="rId25"/>
+    <p:sldId id="274" r:id="rId26"/>
   </p:sldIdLst>
   <p:sldSz cx="10080625" cy="7559675"/>
   <p:notesSz cx="7559675" cy="10691813"/>
@@ -128,6 +137,564 @@
     </p:ext>
   </p:extLst>
 </p:presentation>
+</file>
+
+<file path=ppt/notesMasters/notesMaster1.xml><?xml version="1.0" encoding="utf-8"?>
+<p:notesMaster xmlns:a="http://schemas.openxmlformats.org/drawingml/2006/main" xmlns:r="http://schemas.openxmlformats.org/officeDocument/2006/relationships" xmlns:p="http://schemas.openxmlformats.org/presentationml/2006/main">
+  <p:cSld>
+    <p:bg>
+      <p:bgRef idx="1001">
+        <a:schemeClr val="bg1"/>
+      </p:bgRef>
+    </p:bg>
+    <p:spTree>
+      <p:nvGrpSpPr>
+        <p:cNvPr id="1" name=""/>
+        <p:cNvGrpSpPr/>
+        <p:nvPr/>
+      </p:nvGrpSpPr>
+      <p:grpSpPr>
+        <a:xfrm>
+          <a:off x="0" y="0"/>
+          <a:ext cx="0" cy="0"/>
+          <a:chOff x="0" y="0"/>
+          <a:chExt cx="0" cy="0"/>
+        </a:xfrm>
+      </p:grpSpPr>
+      <p:sp>
+        <p:nvSpPr>
+          <p:cNvPr id="2" name="Symbol zastępczy nagłówka 1"/>
+          <p:cNvSpPr>
+            <a:spLocks noGrp="1"/>
+          </p:cNvSpPr>
+          <p:nvPr>
+            <p:ph type="hdr" sz="quarter"/>
+          </p:nvPr>
+        </p:nvSpPr>
+        <p:spPr>
+          <a:xfrm>
+            <a:off x="0" y="0"/>
+            <a:ext cx="3276600" cy="536575"/>
+          </a:xfrm>
+          <a:prstGeom prst="rect">
+            <a:avLst/>
+          </a:prstGeom>
+        </p:spPr>
+        <p:txBody>
+          <a:bodyPr vert="horz" lIns="91440" tIns="45720" rIns="91440" bIns="45720" rtlCol="0"/>
+          <a:lstStyle>
+            <a:lvl1pPr algn="l">
+              <a:defRPr sz="1200"/>
+            </a:lvl1pPr>
+          </a:lstStyle>
+          <a:p>
+            <a:endParaRPr lang="pl-PL"/>
+          </a:p>
+        </p:txBody>
+      </p:sp>
+      <p:sp>
+        <p:nvSpPr>
+          <p:cNvPr id="3" name="Symbol zastępczy daty 2"/>
+          <p:cNvSpPr>
+            <a:spLocks noGrp="1"/>
+          </p:cNvSpPr>
+          <p:nvPr>
+            <p:ph type="dt" idx="1"/>
+          </p:nvPr>
+        </p:nvSpPr>
+        <p:spPr>
+          <a:xfrm>
+            <a:off x="4281488" y="0"/>
+            <a:ext cx="3276600" cy="536575"/>
+          </a:xfrm>
+          <a:prstGeom prst="rect">
+            <a:avLst/>
+          </a:prstGeom>
+        </p:spPr>
+        <p:txBody>
+          <a:bodyPr vert="horz" lIns="91440" tIns="45720" rIns="91440" bIns="45720" rtlCol="0"/>
+          <a:lstStyle>
+            <a:lvl1pPr algn="r">
+              <a:defRPr sz="1200"/>
+            </a:lvl1pPr>
+          </a:lstStyle>
+          <a:p>
+            <a:fld id="{8E41352D-F32E-4FD7-B298-464189D28DDD}" type="datetimeFigureOut">
+              <a:rPr lang="pl-PL" smtClean="0"/>
+              <a:t>20.12.2015</a:t>
+            </a:fld>
+            <a:endParaRPr lang="pl-PL"/>
+          </a:p>
+        </p:txBody>
+      </p:sp>
+      <p:sp>
+        <p:nvSpPr>
+          <p:cNvPr id="4" name="Symbol zastępczy obrazu slajdu 3"/>
+          <p:cNvSpPr>
+            <a:spLocks noGrp="1" noRot="1" noChangeAspect="1"/>
+          </p:cNvSpPr>
+          <p:nvPr>
+            <p:ph type="sldImg" idx="2"/>
+          </p:nvPr>
+        </p:nvSpPr>
+        <p:spPr>
+          <a:xfrm>
+            <a:off x="1374775" y="1336675"/>
+            <a:ext cx="4810125" cy="3608388"/>
+          </a:xfrm>
+          <a:prstGeom prst="rect">
+            <a:avLst/>
+          </a:prstGeom>
+          <a:noFill/>
+          <a:ln w="12700">
+            <a:solidFill>
+              <a:prstClr val="black"/>
+            </a:solidFill>
+          </a:ln>
+        </p:spPr>
+        <p:txBody>
+          <a:bodyPr vert="horz" lIns="91440" tIns="45720" rIns="91440" bIns="45720" rtlCol="0" anchor="ctr"/>
+          <a:lstStyle/>
+          <a:p>
+            <a:endParaRPr lang="pl-PL"/>
+          </a:p>
+        </p:txBody>
+      </p:sp>
+      <p:sp>
+        <p:nvSpPr>
+          <p:cNvPr id="5" name="Symbol zastępczy notatek 4"/>
+          <p:cNvSpPr>
+            <a:spLocks noGrp="1"/>
+          </p:cNvSpPr>
+          <p:nvPr>
+            <p:ph type="body" sz="quarter" idx="3"/>
+          </p:nvPr>
+        </p:nvSpPr>
+        <p:spPr>
+          <a:xfrm>
+            <a:off x="755650" y="5145088"/>
+            <a:ext cx="6048375" cy="4210050"/>
+          </a:xfrm>
+          <a:prstGeom prst="rect">
+            <a:avLst/>
+          </a:prstGeom>
+        </p:spPr>
+        <p:txBody>
+          <a:bodyPr vert="horz" lIns="91440" tIns="45720" rIns="91440" bIns="45720" rtlCol="0"/>
+          <a:lstStyle/>
+          <a:p>
+            <a:pPr lvl="0"/>
+            <a:r>
+              <a:rPr lang="pl-PL" smtClean="0"/>
+              <a:t>Kliknij, aby edytować style wzorca tekstu</a:t>
+            </a:r>
+          </a:p>
+          <a:p>
+            <a:pPr lvl="1"/>
+            <a:r>
+              <a:rPr lang="pl-PL" smtClean="0"/>
+              <a:t>Drugi poziom</a:t>
+            </a:r>
+          </a:p>
+          <a:p>
+            <a:pPr lvl="2"/>
+            <a:r>
+              <a:rPr lang="pl-PL" smtClean="0"/>
+              <a:t>Trzeci poziom</a:t>
+            </a:r>
+          </a:p>
+          <a:p>
+            <a:pPr lvl="3"/>
+            <a:r>
+              <a:rPr lang="pl-PL" smtClean="0"/>
+              <a:t>Czwarty poziom</a:t>
+            </a:r>
+          </a:p>
+          <a:p>
+            <a:pPr lvl="4"/>
+            <a:r>
+              <a:rPr lang="pl-PL" smtClean="0"/>
+              <a:t>Piąty poziom</a:t>
+            </a:r>
+            <a:endParaRPr lang="pl-PL"/>
+          </a:p>
+        </p:txBody>
+      </p:sp>
+      <p:sp>
+        <p:nvSpPr>
+          <p:cNvPr id="6" name="Symbol zastępczy stopki 5"/>
+          <p:cNvSpPr>
+            <a:spLocks noGrp="1"/>
+          </p:cNvSpPr>
+          <p:nvPr>
+            <p:ph type="ftr" sz="quarter" idx="4"/>
+          </p:nvPr>
+        </p:nvSpPr>
+        <p:spPr>
+          <a:xfrm>
+            <a:off x="0" y="10155238"/>
+            <a:ext cx="3276600" cy="536575"/>
+          </a:xfrm>
+          <a:prstGeom prst="rect">
+            <a:avLst/>
+          </a:prstGeom>
+        </p:spPr>
+        <p:txBody>
+          <a:bodyPr vert="horz" lIns="91440" tIns="45720" rIns="91440" bIns="45720" rtlCol="0" anchor="b"/>
+          <a:lstStyle>
+            <a:lvl1pPr algn="l">
+              <a:defRPr sz="1200"/>
+            </a:lvl1pPr>
+          </a:lstStyle>
+          <a:p>
+            <a:endParaRPr lang="pl-PL"/>
+          </a:p>
+        </p:txBody>
+      </p:sp>
+      <p:sp>
+        <p:nvSpPr>
+          <p:cNvPr id="7" name="Symbol zastępczy numeru slajdu 6"/>
+          <p:cNvSpPr>
+            <a:spLocks noGrp="1"/>
+          </p:cNvSpPr>
+          <p:nvPr>
+            <p:ph type="sldNum" sz="quarter" idx="5"/>
+          </p:nvPr>
+        </p:nvSpPr>
+        <p:spPr>
+          <a:xfrm>
+            <a:off x="4281488" y="10155238"/>
+            <a:ext cx="3276600" cy="536575"/>
+          </a:xfrm>
+          <a:prstGeom prst="rect">
+            <a:avLst/>
+          </a:prstGeom>
+        </p:spPr>
+        <p:txBody>
+          <a:bodyPr vert="horz" lIns="91440" tIns="45720" rIns="91440" bIns="45720" rtlCol="0" anchor="b"/>
+          <a:lstStyle>
+            <a:lvl1pPr algn="r">
+              <a:defRPr sz="1200"/>
+            </a:lvl1pPr>
+          </a:lstStyle>
+          <a:p>
+            <a:fld id="{A349D0AF-8CCB-4533-9B50-1F9E55D3476C}" type="slidenum">
+              <a:rPr lang="pl-PL" smtClean="0"/>
+              <a:t>‹#›</a:t>
+            </a:fld>
+            <a:endParaRPr lang="pl-PL"/>
+          </a:p>
+        </p:txBody>
+      </p:sp>
+    </p:spTree>
+    <p:extLst>
+      <p:ext uri="{BB962C8B-B14F-4D97-AF65-F5344CB8AC3E}">
+        <p14:creationId xmlns:p14="http://schemas.microsoft.com/office/powerpoint/2010/main" val="515032369"/>
+      </p:ext>
+    </p:extLst>
+  </p:cSld>
+  <p:clrMap bg1="lt1" tx1="dk1" bg2="lt2" tx2="dk2" accent1="accent1" accent2="accent2" accent3="accent3" accent4="accent4" accent5="accent5" accent6="accent6" hlink="hlink" folHlink="folHlink"/>
+  <p:notesStyle>
+    <a:lvl1pPr marL="0" algn="l" defTabSz="914400" rtl="0" eaLnBrk="1" latinLnBrk="0" hangingPunct="1">
+      <a:defRPr sz="1200" kern="1200">
+        <a:solidFill>
+          <a:schemeClr val="tx1"/>
+        </a:solidFill>
+        <a:latin typeface="+mn-lt"/>
+        <a:ea typeface="+mn-ea"/>
+        <a:cs typeface="+mn-cs"/>
+      </a:defRPr>
+    </a:lvl1pPr>
+    <a:lvl2pPr marL="457200" algn="l" defTabSz="914400" rtl="0" eaLnBrk="1" latinLnBrk="0" hangingPunct="1">
+      <a:defRPr sz="1200" kern="1200">
+        <a:solidFill>
+          <a:schemeClr val="tx1"/>
+        </a:solidFill>
+        <a:latin typeface="+mn-lt"/>
+        <a:ea typeface="+mn-ea"/>
+        <a:cs typeface="+mn-cs"/>
+      </a:defRPr>
+    </a:lvl2pPr>
+    <a:lvl3pPr marL="914400" algn="l" defTabSz="914400" rtl="0" eaLnBrk="1" latinLnBrk="0" hangingPunct="1">
+      <a:defRPr sz="1200" kern="1200">
+        <a:solidFill>
+          <a:schemeClr val="tx1"/>
+        </a:solidFill>
+        <a:latin typeface="+mn-lt"/>
+        <a:ea typeface="+mn-ea"/>
+        <a:cs typeface="+mn-cs"/>
+      </a:defRPr>
+    </a:lvl3pPr>
+    <a:lvl4pPr marL="1371600" algn="l" defTabSz="914400" rtl="0" eaLnBrk="1" latinLnBrk="0" hangingPunct="1">
+      <a:defRPr sz="1200" kern="1200">
+        <a:solidFill>
+          <a:schemeClr val="tx1"/>
+        </a:solidFill>
+        <a:latin typeface="+mn-lt"/>
+        <a:ea typeface="+mn-ea"/>
+        <a:cs typeface="+mn-cs"/>
+      </a:defRPr>
+    </a:lvl4pPr>
+    <a:lvl5pPr marL="1828800" algn="l" defTabSz="914400" rtl="0" eaLnBrk="1" latinLnBrk="0" hangingPunct="1">
+      <a:defRPr sz="1200" kern="1200">
+        <a:solidFill>
+          <a:schemeClr val="tx1"/>
+        </a:solidFill>
+        <a:latin typeface="+mn-lt"/>
+        <a:ea typeface="+mn-ea"/>
+        <a:cs typeface="+mn-cs"/>
+      </a:defRPr>
+    </a:lvl5pPr>
+    <a:lvl6pPr marL="2286000" algn="l" defTabSz="914400" rtl="0" eaLnBrk="1" latinLnBrk="0" hangingPunct="1">
+      <a:defRPr sz="1200" kern="1200">
+        <a:solidFill>
+          <a:schemeClr val="tx1"/>
+        </a:solidFill>
+        <a:latin typeface="+mn-lt"/>
+        <a:ea typeface="+mn-ea"/>
+        <a:cs typeface="+mn-cs"/>
+      </a:defRPr>
+    </a:lvl6pPr>
+    <a:lvl7pPr marL="2743200" algn="l" defTabSz="914400" rtl="0" eaLnBrk="1" latinLnBrk="0" hangingPunct="1">
+      <a:defRPr sz="1200" kern="1200">
+        <a:solidFill>
+          <a:schemeClr val="tx1"/>
+        </a:solidFill>
+        <a:latin typeface="+mn-lt"/>
+        <a:ea typeface="+mn-ea"/>
+        <a:cs typeface="+mn-cs"/>
+      </a:defRPr>
+    </a:lvl7pPr>
+    <a:lvl8pPr marL="3200400" algn="l" defTabSz="914400" rtl="0" eaLnBrk="1" latinLnBrk="0" hangingPunct="1">
+      <a:defRPr sz="1200" kern="1200">
+        <a:solidFill>
+          <a:schemeClr val="tx1"/>
+        </a:solidFill>
+        <a:latin typeface="+mn-lt"/>
+        <a:ea typeface="+mn-ea"/>
+        <a:cs typeface="+mn-cs"/>
+      </a:defRPr>
+    </a:lvl8pPr>
+    <a:lvl9pPr marL="3657600" algn="l" defTabSz="914400" rtl="0" eaLnBrk="1" latinLnBrk="0" hangingPunct="1">
+      <a:defRPr sz="1200" kern="1200">
+        <a:solidFill>
+          <a:schemeClr val="tx1"/>
+        </a:solidFill>
+        <a:latin typeface="+mn-lt"/>
+        <a:ea typeface="+mn-ea"/>
+        <a:cs typeface="+mn-cs"/>
+      </a:defRPr>
+    </a:lvl9pPr>
+  </p:notesStyle>
+</p:notesMaster>
+</file>
+
+<file path=ppt/notesSlides/notesSlide1.xml><?xml version="1.0" encoding="utf-8"?>
+<p:notes xmlns:a="http://schemas.openxmlformats.org/drawingml/2006/main" xmlns:r="http://schemas.openxmlformats.org/officeDocument/2006/relationships" xmlns:p="http://schemas.openxmlformats.org/presentationml/2006/main">
+  <p:cSld>
+    <p:spTree>
+      <p:nvGrpSpPr>
+        <p:cNvPr id="1" name=""/>
+        <p:cNvGrpSpPr/>
+        <p:nvPr/>
+      </p:nvGrpSpPr>
+      <p:grpSpPr>
+        <a:xfrm>
+          <a:off x="0" y="0"/>
+          <a:ext cx="0" cy="0"/>
+          <a:chOff x="0" y="0"/>
+          <a:chExt cx="0" cy="0"/>
+        </a:xfrm>
+      </p:grpSpPr>
+      <p:sp>
+        <p:nvSpPr>
+          <p:cNvPr id="2" name="Symbol zastępczy obrazu slajdu 1"/>
+          <p:cNvSpPr>
+            <a:spLocks noGrp="1" noRot="1" noChangeAspect="1"/>
+          </p:cNvSpPr>
+          <p:nvPr>
+            <p:ph type="sldImg"/>
+          </p:nvPr>
+        </p:nvSpPr>
+        <p:spPr/>
+      </p:sp>
+      <p:sp>
+        <p:nvSpPr>
+          <p:cNvPr id="3" name="Symbol zastępczy notatek 2"/>
+          <p:cNvSpPr>
+            <a:spLocks noGrp="1"/>
+          </p:cNvSpPr>
+          <p:nvPr>
+            <p:ph type="body" idx="1"/>
+          </p:nvPr>
+        </p:nvSpPr>
+        <p:spPr/>
+        <p:txBody>
+          <a:bodyPr/>
+          <a:lstStyle/>
+          <a:p>
+            <a:r>
+              <a:rPr lang="pl-PL" dirty="0" smtClean="0"/>
+              <a:t>Kod przedstawiony na slajdzie znajduje</a:t>
+            </a:r>
+            <a:r>
+              <a:rPr lang="pl-PL" baseline="0" dirty="0" smtClean="0"/>
+              <a:t> się w Repozytorium.</a:t>
+            </a:r>
+          </a:p>
+          <a:p>
+            <a:r>
+              <a:rPr lang="pl-PL" baseline="0" dirty="0" smtClean="0"/>
+              <a:t>Plik jest dostępny pod adresem: </a:t>
+            </a:r>
+            <a:r>
+              <a:rPr lang="pl-PL" dirty="0" smtClean="0">
+                <a:hlinkClick r:id="rId3"/>
+              </a:rPr>
+              <a:t>https://github.com/psienko/job_finder/blob/master/ui/src/app/authentication/services/authInterceptor.service.js</a:t>
+            </a:r>
+            <a:endParaRPr lang="pl-PL" dirty="0"/>
+          </a:p>
+        </p:txBody>
+      </p:sp>
+      <p:sp>
+        <p:nvSpPr>
+          <p:cNvPr id="4" name="Symbol zastępczy numeru slajdu 3"/>
+          <p:cNvSpPr>
+            <a:spLocks noGrp="1"/>
+          </p:cNvSpPr>
+          <p:nvPr>
+            <p:ph type="sldNum" sz="quarter" idx="10"/>
+          </p:nvPr>
+        </p:nvSpPr>
+        <p:spPr/>
+        <p:txBody>
+          <a:bodyPr/>
+          <a:lstStyle/>
+          <a:p>
+            <a:fld id="{A349D0AF-8CCB-4533-9B50-1F9E55D3476C}" type="slidenum">
+              <a:rPr lang="pl-PL" smtClean="0"/>
+              <a:t>22</a:t>
+            </a:fld>
+            <a:endParaRPr lang="pl-PL"/>
+          </a:p>
+        </p:txBody>
+      </p:sp>
+    </p:spTree>
+    <p:extLst>
+      <p:ext uri="{BB962C8B-B14F-4D97-AF65-F5344CB8AC3E}">
+        <p14:creationId xmlns:p14="http://schemas.microsoft.com/office/powerpoint/2010/main" val="2420091577"/>
+      </p:ext>
+    </p:extLst>
+  </p:cSld>
+  <p:clrMapOvr>
+    <a:masterClrMapping/>
+  </p:clrMapOvr>
+</p:notes>
+</file>
+
+<file path=ppt/notesSlides/notesSlide2.xml><?xml version="1.0" encoding="utf-8"?>
+<p:notes xmlns:a="http://schemas.openxmlformats.org/drawingml/2006/main" xmlns:r="http://schemas.openxmlformats.org/officeDocument/2006/relationships" xmlns:p="http://schemas.openxmlformats.org/presentationml/2006/main">
+  <p:cSld>
+    <p:spTree>
+      <p:nvGrpSpPr>
+        <p:cNvPr id="1" name=""/>
+        <p:cNvGrpSpPr/>
+        <p:nvPr/>
+      </p:nvGrpSpPr>
+      <p:grpSpPr>
+        <a:xfrm>
+          <a:off x="0" y="0"/>
+          <a:ext cx="0" cy="0"/>
+          <a:chOff x="0" y="0"/>
+          <a:chExt cx="0" cy="0"/>
+        </a:xfrm>
+      </p:grpSpPr>
+      <p:sp>
+        <p:nvSpPr>
+          <p:cNvPr id="2" name="Symbol zastępczy obrazu slajdu 1"/>
+          <p:cNvSpPr>
+            <a:spLocks noGrp="1" noRot="1" noChangeAspect="1"/>
+          </p:cNvSpPr>
+          <p:nvPr>
+            <p:ph type="sldImg"/>
+          </p:nvPr>
+        </p:nvSpPr>
+        <p:spPr/>
+      </p:sp>
+      <p:sp>
+        <p:nvSpPr>
+          <p:cNvPr id="3" name="Symbol zastępczy notatek 2"/>
+          <p:cNvSpPr>
+            <a:spLocks noGrp="1"/>
+          </p:cNvSpPr>
+          <p:nvPr>
+            <p:ph type="body" idx="1"/>
+          </p:nvPr>
+        </p:nvSpPr>
+        <p:spPr/>
+        <p:txBody>
+          <a:bodyPr/>
+          <a:lstStyle/>
+          <a:p>
+            <a:r>
+              <a:rPr lang="pl-PL" dirty="0" smtClean="0"/>
+              <a:t>Kod przedstawiony na slajdzie znajduje</a:t>
+            </a:r>
+            <a:r>
+              <a:rPr lang="pl-PL" baseline="0" dirty="0" smtClean="0"/>
+              <a:t> się w Repozytorium.</a:t>
+            </a:r>
+          </a:p>
+          <a:p>
+            <a:r>
+              <a:rPr lang="pl-PL" baseline="0" dirty="0" smtClean="0"/>
+              <a:t>Plik jest dostępny pod adresem: </a:t>
+            </a:r>
+            <a:r>
+              <a:rPr lang="pl-PL" dirty="0" smtClean="0">
+                <a:hlinkClick r:id="rId3"/>
+              </a:rPr>
+              <a:t>https://github.com/psienko/job_finder/blob/master/ui/src/app/authentication/services/authInterceptor.service.js</a:t>
+            </a:r>
+            <a:endParaRPr lang="pl-PL" dirty="0"/>
+          </a:p>
+        </p:txBody>
+      </p:sp>
+      <p:sp>
+        <p:nvSpPr>
+          <p:cNvPr id="4" name="Symbol zastępczy numeru slajdu 3"/>
+          <p:cNvSpPr>
+            <a:spLocks noGrp="1"/>
+          </p:cNvSpPr>
+          <p:nvPr>
+            <p:ph type="sldNum" sz="quarter" idx="10"/>
+          </p:nvPr>
+        </p:nvSpPr>
+        <p:spPr/>
+        <p:txBody>
+          <a:bodyPr/>
+          <a:lstStyle/>
+          <a:p>
+            <a:fld id="{A349D0AF-8CCB-4533-9B50-1F9E55D3476C}" type="slidenum">
+              <a:rPr lang="pl-PL" smtClean="0"/>
+              <a:t>23</a:t>
+            </a:fld>
+            <a:endParaRPr lang="pl-PL"/>
+          </a:p>
+        </p:txBody>
+      </p:sp>
+    </p:spTree>
+    <p:extLst>
+      <p:ext uri="{BB962C8B-B14F-4D97-AF65-F5344CB8AC3E}">
+        <p14:creationId xmlns:p14="http://schemas.microsoft.com/office/powerpoint/2010/main" val="447586604"/>
+      </p:ext>
+    </p:extLst>
+  </p:cSld>
+  <p:clrMapOvr>
+    <a:masterClrMapping/>
+  </p:clrMapOvr>
+</p:notes>
 </file>
 
 <file path=ppt/slideLayouts/slideLayout1.xml><?xml version="1.0" encoding="utf-8"?>
@@ -6370,10 +6937,683 @@
   <p:clrMapOvr>
     <a:masterClrMapping/>
   </p:clrMapOvr>
+  <p:timing>
+    <p:tnLst>
+      <p:par>
+        <p:cTn id="1" dur="indefinite" restart="never" nodeType="tmRoot"/>
+      </p:par>
+    </p:tnLst>
+  </p:timing>
 </p:sld>
 </file>
 
 <file path=ppt/slides/slide10.xml><?xml version="1.0" encoding="utf-8"?>
+<p:sld xmlns:a="http://schemas.openxmlformats.org/drawingml/2006/main" xmlns:r="http://schemas.openxmlformats.org/officeDocument/2006/relationships" xmlns:p="http://schemas.openxmlformats.org/presentationml/2006/main">
+  <p:cSld>
+    <p:spTree>
+      <p:nvGrpSpPr>
+        <p:cNvPr id="1" name=""/>
+        <p:cNvGrpSpPr/>
+        <p:nvPr/>
+      </p:nvGrpSpPr>
+      <p:grpSpPr>
+        <a:xfrm>
+          <a:off x="0" y="0"/>
+          <a:ext cx="0" cy="0"/>
+          <a:chOff x="0" y="0"/>
+          <a:chExt cx="0" cy="0"/>
+        </a:xfrm>
+      </p:grpSpPr>
+      <p:sp>
+        <p:nvSpPr>
+          <p:cNvPr id="2" name="Tytuł 1"/>
+          <p:cNvSpPr>
+            <a:spLocks noGrp="1"/>
+          </p:cNvSpPr>
+          <p:nvPr>
+            <p:ph type="title"/>
+          </p:nvPr>
+        </p:nvSpPr>
+        <p:spPr/>
+        <p:txBody>
+          <a:bodyPr/>
+          <a:lstStyle/>
+          <a:p>
+            <a:endParaRPr lang="pl-PL"/>
+          </a:p>
+        </p:txBody>
+      </p:sp>
+      <p:pic>
+        <p:nvPicPr>
+          <p:cNvPr id="4" name="image02.png"/>
+          <p:cNvPicPr>
+            <a:picLocks noGrp="1"/>
+          </p:cNvPicPr>
+          <p:nvPr>
+            <p:ph idx="1"/>
+          </p:nvPr>
+        </p:nvPicPr>
+        <p:blipFill>
+          <a:blip r:embed="rId2"/>
+          <a:srcRect/>
+          <a:stretch>
+            <a:fillRect/>
+          </a:stretch>
+        </p:blipFill>
+        <p:spPr>
+          <a:xfrm>
+            <a:off x="1744492" y="576407"/>
+            <a:ext cx="7007380" cy="6639205"/>
+          </a:xfrm>
+          <a:prstGeom prst="rect">
+            <a:avLst/>
+          </a:prstGeom>
+          <a:ln/>
+        </p:spPr>
+      </p:pic>
+    </p:spTree>
+    <p:extLst>
+      <p:ext uri="{BB962C8B-B14F-4D97-AF65-F5344CB8AC3E}">
+        <p14:creationId xmlns:p14="http://schemas.microsoft.com/office/powerpoint/2010/main" val="1999163763"/>
+      </p:ext>
+    </p:extLst>
+  </p:cSld>
+  <p:clrMapOvr>
+    <a:masterClrMapping/>
+  </p:clrMapOvr>
+  <p:timing>
+    <p:tnLst>
+      <p:par>
+        <p:cTn id="1" dur="indefinite" restart="never" nodeType="tmRoot"/>
+      </p:par>
+    </p:tnLst>
+  </p:timing>
+</p:sld>
+</file>
+
+<file path=ppt/slides/slide11.xml><?xml version="1.0" encoding="utf-8"?>
+<p:sld xmlns:a="http://schemas.openxmlformats.org/drawingml/2006/main" xmlns:r="http://schemas.openxmlformats.org/officeDocument/2006/relationships" xmlns:p="http://schemas.openxmlformats.org/presentationml/2006/main">
+  <p:cSld>
+    <p:spTree>
+      <p:nvGrpSpPr>
+        <p:cNvPr id="1" name=""/>
+        <p:cNvGrpSpPr/>
+        <p:nvPr/>
+      </p:nvGrpSpPr>
+      <p:grpSpPr>
+        <a:xfrm>
+          <a:off x="0" y="0"/>
+          <a:ext cx="0" cy="0"/>
+          <a:chOff x="0" y="0"/>
+          <a:chExt cx="0" cy="0"/>
+        </a:xfrm>
+      </p:grpSpPr>
+      <p:sp>
+        <p:nvSpPr>
+          <p:cNvPr id="2" name="Tytuł 1"/>
+          <p:cNvSpPr>
+            <a:spLocks noGrp="1"/>
+          </p:cNvSpPr>
+          <p:nvPr>
+            <p:ph type="title"/>
+          </p:nvPr>
+        </p:nvSpPr>
+        <p:spPr/>
+        <p:txBody>
+          <a:bodyPr/>
+          <a:lstStyle/>
+          <a:p>
+            <a:endParaRPr lang="pl-PL"/>
+          </a:p>
+        </p:txBody>
+      </p:sp>
+      <p:pic>
+        <p:nvPicPr>
+          <p:cNvPr id="4" name="Symbol zastępczy zawartości 3"/>
+          <p:cNvPicPr>
+            <a:picLocks noGrp="1" noChangeAspect="1"/>
+          </p:cNvPicPr>
+          <p:nvPr>
+            <p:ph idx="1"/>
+          </p:nvPr>
+        </p:nvPicPr>
+        <p:blipFill>
+          <a:blip r:embed="rId2"/>
+          <a:stretch>
+            <a:fillRect/>
+          </a:stretch>
+        </p:blipFill>
+        <p:spPr>
+          <a:xfrm>
+            <a:off x="2139073" y="104522"/>
+            <a:ext cx="6543199" cy="7387190"/>
+          </a:xfrm>
+          <a:prstGeom prst="rect">
+            <a:avLst/>
+          </a:prstGeom>
+        </p:spPr>
+      </p:pic>
+    </p:spTree>
+    <p:extLst>
+      <p:ext uri="{BB962C8B-B14F-4D97-AF65-F5344CB8AC3E}">
+        <p14:creationId xmlns:p14="http://schemas.microsoft.com/office/powerpoint/2010/main" val="3448912205"/>
+      </p:ext>
+    </p:extLst>
+  </p:cSld>
+  <p:clrMapOvr>
+    <a:masterClrMapping/>
+  </p:clrMapOvr>
+  <p:timing>
+    <p:tnLst>
+      <p:par>
+        <p:cTn id="1" dur="indefinite" restart="never" nodeType="tmRoot"/>
+      </p:par>
+    </p:tnLst>
+  </p:timing>
+</p:sld>
+</file>
+
+<file path=ppt/slides/slide12.xml><?xml version="1.0" encoding="utf-8"?>
+<p:sld xmlns:a="http://schemas.openxmlformats.org/drawingml/2006/main" xmlns:r="http://schemas.openxmlformats.org/officeDocument/2006/relationships" xmlns:p="http://schemas.openxmlformats.org/presentationml/2006/main">
+  <p:cSld>
+    <p:spTree>
+      <p:nvGrpSpPr>
+        <p:cNvPr id="1" name=""/>
+        <p:cNvGrpSpPr/>
+        <p:nvPr/>
+      </p:nvGrpSpPr>
+      <p:grpSpPr>
+        <a:xfrm>
+          <a:off x="0" y="0"/>
+          <a:ext cx="0" cy="0"/>
+          <a:chOff x="0" y="0"/>
+          <a:chExt cx="0" cy="0"/>
+        </a:xfrm>
+      </p:grpSpPr>
+      <p:sp>
+        <p:nvSpPr>
+          <p:cNvPr id="2" name="Tytuł 1"/>
+          <p:cNvSpPr>
+            <a:spLocks noGrp="1"/>
+          </p:cNvSpPr>
+          <p:nvPr>
+            <p:ph type="title"/>
+          </p:nvPr>
+        </p:nvSpPr>
+        <p:spPr/>
+        <p:txBody>
+          <a:bodyPr/>
+          <a:lstStyle/>
+          <a:p>
+            <a:endParaRPr lang="pl-PL"/>
+          </a:p>
+        </p:txBody>
+      </p:sp>
+      <p:sp>
+        <p:nvSpPr>
+          <p:cNvPr id="3" name="Symbol zastępczy zawartości 2"/>
+          <p:cNvSpPr>
+            <a:spLocks noGrp="1"/>
+          </p:cNvSpPr>
+          <p:nvPr>
+            <p:ph idx="1"/>
+          </p:nvPr>
+        </p:nvSpPr>
+        <p:spPr/>
+        <p:txBody>
+          <a:bodyPr/>
+          <a:lstStyle/>
+          <a:p>
+            <a:endParaRPr lang="pl-PL"/>
+          </a:p>
+        </p:txBody>
+      </p:sp>
+      <p:pic>
+        <p:nvPicPr>
+          <p:cNvPr id="4" name="Obraz 3"/>
+          <p:cNvPicPr>
+            <a:picLocks noChangeAspect="1"/>
+          </p:cNvPicPr>
+          <p:nvPr/>
+        </p:nvPicPr>
+        <p:blipFill>
+          <a:blip r:embed="rId2"/>
+          <a:stretch>
+            <a:fillRect/>
+          </a:stretch>
+        </p:blipFill>
+        <p:spPr>
+          <a:xfrm>
+            <a:off x="1518354" y="98626"/>
+            <a:ext cx="7622619" cy="7390028"/>
+          </a:xfrm>
+          <a:prstGeom prst="rect">
+            <a:avLst/>
+          </a:prstGeom>
+        </p:spPr>
+      </p:pic>
+    </p:spTree>
+    <p:extLst>
+      <p:ext uri="{BB962C8B-B14F-4D97-AF65-F5344CB8AC3E}">
+        <p14:creationId xmlns:p14="http://schemas.microsoft.com/office/powerpoint/2010/main" val="1456673731"/>
+      </p:ext>
+    </p:extLst>
+  </p:cSld>
+  <p:clrMapOvr>
+    <a:masterClrMapping/>
+  </p:clrMapOvr>
+  <p:timing>
+    <p:tnLst>
+      <p:par>
+        <p:cTn id="1" dur="indefinite" restart="never" nodeType="tmRoot"/>
+      </p:par>
+    </p:tnLst>
+  </p:timing>
+</p:sld>
+</file>
+
+<file path=ppt/slides/slide13.xml><?xml version="1.0" encoding="utf-8"?>
+<p:sld xmlns:a="http://schemas.openxmlformats.org/drawingml/2006/main" xmlns:r="http://schemas.openxmlformats.org/officeDocument/2006/relationships" xmlns:p="http://schemas.openxmlformats.org/presentationml/2006/main">
+  <p:cSld>
+    <p:spTree>
+      <p:nvGrpSpPr>
+        <p:cNvPr id="1" name=""/>
+        <p:cNvGrpSpPr/>
+        <p:nvPr/>
+      </p:nvGrpSpPr>
+      <p:grpSpPr>
+        <a:xfrm>
+          <a:off x="0" y="0"/>
+          <a:ext cx="0" cy="0"/>
+          <a:chOff x="0" y="0"/>
+          <a:chExt cx="0" cy="0"/>
+        </a:xfrm>
+      </p:grpSpPr>
+      <p:sp>
+        <p:nvSpPr>
+          <p:cNvPr id="2" name="Tytuł 1"/>
+          <p:cNvSpPr>
+            <a:spLocks noGrp="1"/>
+          </p:cNvSpPr>
+          <p:nvPr>
+            <p:ph type="title"/>
+          </p:nvPr>
+        </p:nvSpPr>
+        <p:spPr/>
+        <p:txBody>
+          <a:bodyPr/>
+          <a:lstStyle/>
+          <a:p>
+            <a:r>
+              <a:rPr lang="pl-PL" dirty="0" smtClean="0"/>
+              <a:t>Git-</a:t>
+            </a:r>
+            <a:r>
+              <a:rPr lang="pl-PL" dirty="0" err="1"/>
+              <a:t>F</a:t>
+            </a:r>
+            <a:r>
+              <a:rPr lang="pl-PL" dirty="0" err="1" smtClean="0"/>
+              <a:t>low</a:t>
+            </a:r>
+            <a:endParaRPr lang="pl-PL" dirty="0"/>
+          </a:p>
+        </p:txBody>
+      </p:sp>
+      <p:pic>
+        <p:nvPicPr>
+          <p:cNvPr id="6" name="Symbol zastępczy zawartości 5"/>
+          <p:cNvPicPr>
+            <a:picLocks noGrp="1" noChangeAspect="1"/>
+          </p:cNvPicPr>
+          <p:nvPr>
+            <p:ph idx="1"/>
+          </p:nvPr>
+        </p:nvPicPr>
+        <p:blipFill>
+          <a:blip r:embed="rId2"/>
+          <a:stretch>
+            <a:fillRect/>
+          </a:stretch>
+        </p:blipFill>
+        <p:spPr>
+          <a:xfrm>
+            <a:off x="24256" y="2561751"/>
+            <a:ext cx="10056370" cy="2712228"/>
+          </a:xfrm>
+          <a:prstGeom prst="rect">
+            <a:avLst/>
+          </a:prstGeom>
+        </p:spPr>
+      </p:pic>
+    </p:spTree>
+    <p:extLst>
+      <p:ext uri="{BB962C8B-B14F-4D97-AF65-F5344CB8AC3E}">
+        <p14:creationId xmlns:p14="http://schemas.microsoft.com/office/powerpoint/2010/main" val="137131490"/>
+      </p:ext>
+    </p:extLst>
+  </p:cSld>
+  <p:clrMapOvr>
+    <a:masterClrMapping/>
+  </p:clrMapOvr>
+  <p:timing>
+    <p:tnLst>
+      <p:par>
+        <p:cTn id="1" dur="indefinite" restart="never" nodeType="tmRoot"/>
+      </p:par>
+    </p:tnLst>
+  </p:timing>
+</p:sld>
+</file>
+
+<file path=ppt/slides/slide14.xml><?xml version="1.0" encoding="utf-8"?>
+<p:sld xmlns:a="http://schemas.openxmlformats.org/drawingml/2006/main" xmlns:r="http://schemas.openxmlformats.org/officeDocument/2006/relationships" xmlns:p="http://schemas.openxmlformats.org/presentationml/2006/main">
+  <p:cSld>
+    <p:spTree>
+      <p:nvGrpSpPr>
+        <p:cNvPr id="1" name=""/>
+        <p:cNvGrpSpPr/>
+        <p:nvPr/>
+      </p:nvGrpSpPr>
+      <p:grpSpPr>
+        <a:xfrm>
+          <a:off x="0" y="0"/>
+          <a:ext cx="0" cy="0"/>
+          <a:chOff x="0" y="0"/>
+          <a:chExt cx="0" cy="0"/>
+        </a:xfrm>
+      </p:grpSpPr>
+      <p:sp>
+        <p:nvSpPr>
+          <p:cNvPr id="2" name="Tytuł 1"/>
+          <p:cNvSpPr>
+            <a:spLocks noGrp="1"/>
+          </p:cNvSpPr>
+          <p:nvPr>
+            <p:ph type="title"/>
+          </p:nvPr>
+        </p:nvSpPr>
+        <p:spPr>
+          <a:xfrm>
+            <a:off x="344032" y="205214"/>
+            <a:ext cx="9232562" cy="1505890"/>
+          </a:xfrm>
+        </p:spPr>
+        <p:txBody>
+          <a:bodyPr/>
+          <a:lstStyle/>
+          <a:p>
+            <a:r>
+              <a:rPr lang="pl-PL" dirty="0"/>
+              <a:t>Proces wytwarzania oprogramowania</a:t>
+            </a:r>
+          </a:p>
+        </p:txBody>
+      </p:sp>
+      <p:sp>
+        <p:nvSpPr>
+          <p:cNvPr id="3" name="Symbol zastępczy zawartości 2"/>
+          <p:cNvSpPr>
+            <a:spLocks noGrp="1"/>
+          </p:cNvSpPr>
+          <p:nvPr>
+            <p:ph idx="1"/>
+          </p:nvPr>
+        </p:nvSpPr>
+        <p:spPr>
+          <a:xfrm>
+            <a:off x="688063" y="1430449"/>
+            <a:ext cx="9297909" cy="6129226"/>
+          </a:xfrm>
+        </p:spPr>
+        <p:txBody>
+          <a:bodyPr>
+            <a:normAutofit/>
+          </a:bodyPr>
+          <a:lstStyle/>
+          <a:p>
+            <a:pPr lvl="0" algn="just"/>
+            <a:r>
+              <a:rPr lang="pl-PL" dirty="0" smtClean="0"/>
+              <a:t>Sprint </a:t>
+            </a:r>
+            <a:r>
+              <a:rPr lang="pl-PL" dirty="0"/>
+              <a:t>trwa 14 dni,</a:t>
+            </a:r>
+          </a:p>
+          <a:p>
+            <a:pPr lvl="0" algn="just"/>
+            <a:r>
+              <a:rPr lang="pl-PL" dirty="0" smtClean="0"/>
+              <a:t>Sprint </a:t>
+            </a:r>
+            <a:r>
+              <a:rPr lang="pl-PL" dirty="0"/>
+              <a:t>rozpoczyna się spotkaniem planistycznym w którym uczestniczy cały Zespól </a:t>
+            </a:r>
+            <a:r>
+              <a:rPr lang="pl-PL" dirty="0" err="1" smtClean="0"/>
+              <a:t>Scrumowy</a:t>
+            </a:r>
+            <a:endParaRPr lang="pl-PL" dirty="0"/>
+          </a:p>
+          <a:p>
+            <a:pPr algn="just"/>
+            <a:r>
+              <a:rPr lang="pl-PL" dirty="0" smtClean="0"/>
+              <a:t>Zespól </a:t>
+            </a:r>
+            <a:r>
+              <a:rPr lang="pl-PL" dirty="0"/>
+              <a:t>deweloperski codziennie uczestniczy w </a:t>
+            </a:r>
+            <a:r>
+              <a:rPr lang="pl-PL" dirty="0" err="1"/>
+              <a:t>Daily</a:t>
+            </a:r>
+            <a:r>
+              <a:rPr lang="pl-PL" dirty="0"/>
+              <a:t> </a:t>
+            </a:r>
+            <a:r>
+              <a:rPr lang="pl-PL" dirty="0" err="1"/>
+              <a:t>Standupie</a:t>
+            </a:r>
+            <a:endParaRPr lang="pl-PL" dirty="0"/>
+          </a:p>
+          <a:p>
+            <a:pPr lvl="0" algn="just"/>
+            <a:r>
+              <a:rPr lang="pl-PL" dirty="0" smtClean="0"/>
+              <a:t>W </a:t>
+            </a:r>
+            <a:r>
+              <a:rPr lang="pl-PL" dirty="0"/>
+              <a:t>każdą środę </a:t>
+            </a:r>
+            <a:r>
+              <a:rPr lang="pl-PL" dirty="0" smtClean="0"/>
+              <a:t>zespół </a:t>
+            </a:r>
+            <a:r>
+              <a:rPr lang="pl-PL" dirty="0"/>
+              <a:t>deweloperski spotyka się z Product </a:t>
+            </a:r>
+            <a:r>
+              <a:rPr lang="pl-PL" dirty="0" err="1" smtClean="0"/>
+              <a:t>Owner</a:t>
+            </a:r>
+            <a:r>
+              <a:rPr lang="pl-PL" dirty="0" smtClean="0"/>
+              <a:t>-em </a:t>
+            </a:r>
+            <a:r>
+              <a:rPr lang="pl-PL" dirty="0"/>
+              <a:t>i estymuje karty w Product </a:t>
+            </a:r>
+            <a:r>
+              <a:rPr lang="pl-PL" dirty="0" err="1" smtClean="0"/>
+              <a:t>Backlogu</a:t>
+            </a:r>
+            <a:endParaRPr lang="pl-PL" dirty="0"/>
+          </a:p>
+          <a:p>
+            <a:pPr lvl="0" algn="just"/>
+            <a:r>
+              <a:rPr lang="pl-PL" dirty="0" smtClean="0"/>
+              <a:t>Sprint </a:t>
+            </a:r>
+            <a:r>
+              <a:rPr lang="pl-PL" dirty="0"/>
+              <a:t>kończy się spotkaniem podczas którego zespól prezentuje funkcjonalności przyrostu iteracji wszystkim interesariuszom (spotkanie demo) i retrospektywą zespołu w swoim zamkniętym gronie.</a:t>
+            </a:r>
+          </a:p>
+          <a:p>
+            <a:pPr algn="just"/>
+            <a:endParaRPr lang="pl-PL" dirty="0"/>
+          </a:p>
+        </p:txBody>
+      </p:sp>
+    </p:spTree>
+    <p:extLst>
+      <p:ext uri="{BB962C8B-B14F-4D97-AF65-F5344CB8AC3E}">
+        <p14:creationId xmlns:p14="http://schemas.microsoft.com/office/powerpoint/2010/main" val="3112259209"/>
+      </p:ext>
+    </p:extLst>
+  </p:cSld>
+  <p:clrMapOvr>
+    <a:masterClrMapping/>
+  </p:clrMapOvr>
+  <p:timing>
+    <p:tnLst>
+      <p:par>
+        <p:cTn id="1" dur="indefinite" restart="never" nodeType="tmRoot"/>
+      </p:par>
+    </p:tnLst>
+  </p:timing>
+</p:sld>
+</file>
+
+<file path=ppt/slides/slide15.xml><?xml version="1.0" encoding="utf-8"?>
+<p:sld xmlns:a="http://schemas.openxmlformats.org/drawingml/2006/main" xmlns:r="http://schemas.openxmlformats.org/officeDocument/2006/relationships" xmlns:p="http://schemas.openxmlformats.org/presentationml/2006/main">
+  <p:cSld>
+    <p:spTree>
+      <p:nvGrpSpPr>
+        <p:cNvPr id="1" name=""/>
+        <p:cNvGrpSpPr/>
+        <p:nvPr/>
+      </p:nvGrpSpPr>
+      <p:grpSpPr>
+        <a:xfrm>
+          <a:off x="0" y="0"/>
+          <a:ext cx="0" cy="0"/>
+          <a:chOff x="0" y="0"/>
+          <a:chExt cx="0" cy="0"/>
+        </a:xfrm>
+      </p:grpSpPr>
+      <p:sp>
+        <p:nvSpPr>
+          <p:cNvPr id="110" name="CustomShape 1"/>
+          <p:cNvSpPr/>
+          <p:nvPr/>
+        </p:nvSpPr>
+        <p:spPr>
+          <a:xfrm>
+            <a:off x="216000" y="2880000"/>
+            <a:ext cx="9071280" cy="1261800"/>
+          </a:xfrm>
+          <a:prstGeom prst="rect">
+            <a:avLst/>
+          </a:prstGeom>
+          <a:noFill/>
+          <a:ln>
+            <a:noFill/>
+          </a:ln>
+        </p:spPr>
+        <p:style>
+          <a:lnRef idx="0">
+            <a:scrgbClr r="0" g="0" b="0"/>
+          </a:lnRef>
+          <a:fillRef idx="0">
+            <a:scrgbClr r="0" g="0" b="0"/>
+          </a:fillRef>
+          <a:effectRef idx="0">
+            <a:scrgbClr r="0" g="0" b="0"/>
+          </a:effectRef>
+          <a:fontRef idx="minor"/>
+        </p:style>
+        <p:txBody>
+          <a:bodyPr lIns="0" tIns="0" rIns="0" bIns="0" anchor="ctr"/>
+          <a:lstStyle/>
+          <a:p>
+            <a:pPr algn="ctr">
+              <a:lnSpc>
+                <a:spcPct val="100000"/>
+              </a:lnSpc>
+            </a:pPr>
+            <a:r>
+              <a:rPr lang="pl-PL" sz="6000" strike="noStrike" spc="-1">
+                <a:uFill>
+                  <a:solidFill>
+                    <a:srgbClr val="FFFFFF"/>
+                  </a:solidFill>
+                </a:uFill>
+                <a:latin typeface="Arial"/>
+              </a:rPr>
+              <a:t>REST API autentykacja</a:t>
+            </a:r>
+            <a:r>
+              <a:rPr lang="pl-PL" sz="4400" strike="noStrike" spc="-1">
+                <a:uFill>
+                  <a:solidFill>
+                    <a:srgbClr val="FFFFFF"/>
+                  </a:solidFill>
+                </a:uFill>
+                <a:latin typeface="Arial"/>
+              </a:rPr>
+              <a:t> </a:t>
+            </a:r>
+            <a:endParaRPr/>
+          </a:p>
+        </p:txBody>
+      </p:sp>
+    </p:spTree>
+  </p:cSld>
+  <p:clrMapOvr>
+    <a:masterClrMapping/>
+  </p:clrMapOvr>
+  <p:timing>
+    <p:tnLst>
+      <p:par>
+        <p:cTn id="1" dur="indefinite" restart="never" nodeType="tmRoot">
+          <p:childTnLst>
+            <p:seq>
+              <p:cTn id="2" nodeType="mainSeq"/>
+              <p:prevCondLst>
+                <p:cond evt="onPrev" delay="0">
+                  <p:tgtEl>
+                    <p:sldTgt/>
+                  </p:tgtEl>
+                </p:cond>
+              </p:prevCondLst>
+              <p:nextCondLst>
+                <p:cond evt="onNext" delay="0">
+                  <p:tgtEl>
+                    <p:sldTgt/>
+                  </p:tgtEl>
+                </p:cond>
+              </p:nextCondLst>
+            </p:seq>
+          </p:childTnLst>
+        </p:cTn>
+      </p:par>
+    </p:tnLst>
+  </p:timing>
+</p:sld>
+</file>
+
+<file path=ppt/slides/slide16.xml><?xml version="1.0" encoding="utf-8"?>
 <p:sld xmlns:a="http://schemas.openxmlformats.org/drawingml/2006/main" xmlns:r="http://schemas.openxmlformats.org/officeDocument/2006/relationships" xmlns:p="http://schemas.openxmlformats.org/presentationml/2006/main">
   <p:cSld>
     <p:spTree>
@@ -6503,7 +7743,7 @@
 </p:sld>
 </file>
 
-<file path=ppt/slides/slide11.xml><?xml version="1.0" encoding="utf-8"?>
+<file path=ppt/slides/slide17.xml><?xml version="1.0" encoding="utf-8"?>
 <p:sld xmlns:a="http://schemas.openxmlformats.org/drawingml/2006/main" xmlns:r="http://schemas.openxmlformats.org/officeDocument/2006/relationships" xmlns:p="http://schemas.openxmlformats.org/presentationml/2006/main">
   <p:cSld>
     <p:spTree>
@@ -6567,7 +7807,7 @@
               <a:buChar char="l"/>
             </a:pPr>
             <a:r>
-              <a:rPr lang="pl-PL" sz="3200" strike="noStrike" spc="-1">
+              <a:rPr lang="pl-PL" sz="3200" strike="noStrike" spc="-1" dirty="0">
                 <a:uFill>
                   <a:solidFill>
                     <a:srgbClr val="FFFFFF"/>
@@ -6575,9 +7815,31 @@
                 </a:uFill>
                 <a:latin typeface="Arial"/>
               </a:rPr>
-              <a:t>Założenia RESTfull wykluczają użycie mechanizmu sesji. Każde żądanie wysyłane przez klienta powinno zawierać wszystkie niezbędne dane do pełnego zrozumienia żądania przez serwer oraz nie może korzystać z możliwości przechowywania kontekstu na serwerze. </a:t>
-            </a:r>
-            <a:endParaRPr/>
+              <a:t>Założenia </a:t>
+            </a:r>
+            <a:r>
+              <a:rPr lang="pl-PL" sz="3200" strike="noStrike" spc="-1" dirty="0" err="1">
+                <a:uFill>
+                  <a:solidFill>
+                    <a:srgbClr val="FFFFFF"/>
+                  </a:solidFill>
+                </a:uFill>
+                <a:latin typeface="Arial"/>
+              </a:rPr>
+              <a:t>RESTfull</a:t>
+            </a:r>
+            <a:r>
+              <a:rPr lang="pl-PL" sz="3200" strike="noStrike" spc="-1" dirty="0">
+                <a:uFill>
+                  <a:solidFill>
+                    <a:srgbClr val="FFFFFF"/>
+                  </a:solidFill>
+                </a:uFill>
+                <a:latin typeface="Arial"/>
+              </a:rPr>
+              <a:t> wykluczają użycie mechanizmu sesji. Każde żądanie wysyłane przez klienta powinno zawierać wszystkie niezbędne dane do pełnego zrozumienia żądania przez serwer oraz nie może korzystać z możliwości przechowywania kontekstu na serwerze. </a:t>
+            </a:r>
+            <a:endParaRPr dirty="0"/>
           </a:p>
         </p:txBody>
       </p:sp>
@@ -6616,7 +7878,7 @@
 </p:sld>
 </file>
 
-<file path=ppt/slides/slide12.xml><?xml version="1.0" encoding="utf-8"?>
+<file path=ppt/slides/slide18.xml><?xml version="1.0" encoding="utf-8"?>
 <p:sld xmlns:a="http://schemas.openxmlformats.org/drawingml/2006/main" xmlns:r="http://schemas.openxmlformats.org/officeDocument/2006/relationships" xmlns:p="http://schemas.openxmlformats.org/presentationml/2006/main">
   <p:cSld>
     <p:spTree>
@@ -6746,7 +8008,7 @@
 </p:sld>
 </file>
 
-<file path=ppt/slides/slide13.xml><?xml version="1.0" encoding="utf-8"?>
+<file path=ppt/slides/slide19.xml><?xml version="1.0" encoding="utf-8"?>
 <p:sld xmlns:a="http://schemas.openxmlformats.org/drawingml/2006/main" xmlns:r="http://schemas.openxmlformats.org/officeDocument/2006/relationships" xmlns:p="http://schemas.openxmlformats.org/presentationml/2006/main">
   <p:cSld>
     <p:spTree>
@@ -6821,7 +8083,174 @@
 </p:sld>
 </file>
 
-<file path=ppt/slides/slide14.xml><?xml version="1.0" encoding="utf-8"?>
+<file path=ppt/slides/slide2.xml><?xml version="1.0" encoding="utf-8"?>
+<p:sld xmlns:a="http://schemas.openxmlformats.org/drawingml/2006/main" xmlns:r="http://schemas.openxmlformats.org/officeDocument/2006/relationships" xmlns:p="http://schemas.openxmlformats.org/presentationml/2006/main">
+  <p:cSld>
+    <p:spTree>
+      <p:nvGrpSpPr>
+        <p:cNvPr id="1" name=""/>
+        <p:cNvGrpSpPr/>
+        <p:nvPr/>
+      </p:nvGrpSpPr>
+      <p:grpSpPr>
+        <a:xfrm>
+          <a:off x="0" y="0"/>
+          <a:ext cx="0" cy="0"/>
+          <a:chOff x="0" y="0"/>
+          <a:chExt cx="0" cy="0"/>
+        </a:xfrm>
+      </p:grpSpPr>
+      <p:sp>
+        <p:nvSpPr>
+          <p:cNvPr id="3" name="Symbol zastępczy zawartości 2"/>
+          <p:cNvSpPr>
+            <a:spLocks noGrp="1"/>
+          </p:cNvSpPr>
+          <p:nvPr>
+            <p:ph idx="1"/>
+          </p:nvPr>
+        </p:nvSpPr>
+        <p:spPr>
+          <a:xfrm>
+            <a:off x="723900" y="76199"/>
+            <a:ext cx="8852694" cy="7362825"/>
+          </a:xfrm>
+        </p:spPr>
+        <p:txBody>
+          <a:bodyPr>
+            <a:normAutofit/>
+          </a:bodyPr>
+          <a:lstStyle/>
+          <a:p>
+            <a:pPr marL="0" indent="0" algn="just">
+              <a:buNone/>
+            </a:pPr>
+            <a:r>
+              <a:rPr lang="pl-PL" sz="3600" dirty="0"/>
+              <a:t>T</a:t>
+            </a:r>
+            <a:r>
+              <a:rPr lang="pl-PL" sz="3600" dirty="0" smtClean="0"/>
+              <a:t>emat </a:t>
+            </a:r>
+            <a:r>
+              <a:rPr lang="pl-PL" sz="3600" dirty="0"/>
+              <a:t>projektu </a:t>
+            </a:r>
+            <a:r>
+              <a:rPr lang="pl-PL" sz="3600" dirty="0" smtClean="0"/>
+              <a:t>to: </a:t>
+            </a:r>
+            <a:r>
+              <a:rPr lang="pl-PL" sz="3600" dirty="0"/>
+              <a:t>„ Giełda pracy dla studentów </a:t>
+            </a:r>
+            <a:r>
+              <a:rPr lang="pl-PL" sz="3600" dirty="0" smtClean="0"/>
+              <a:t>kontrolowana </a:t>
+            </a:r>
+            <a:r>
+              <a:rPr lang="pl-PL" sz="3600" dirty="0"/>
+              <a:t>możliwość dodawania ofert, prezentacja firm</a:t>
+            </a:r>
+            <a:r>
+              <a:rPr lang="pl-PL" sz="3600" dirty="0" smtClean="0"/>
+              <a:t>)”. </a:t>
+            </a:r>
+            <a:r>
+              <a:rPr lang="pl-PL" sz="3600" dirty="0"/>
+              <a:t>Podczas </a:t>
+            </a:r>
+            <a:r>
+              <a:rPr lang="pl-PL" sz="3600" dirty="0" smtClean="0"/>
+              <a:t>jego realizacji</a:t>
+            </a:r>
+            <a:r>
+              <a:rPr lang="pl-PL" sz="3600" dirty="0"/>
+              <a:t>  przedłożymy wymagania na zadania, będziemy </a:t>
+            </a:r>
+            <a:r>
+              <a:rPr lang="pl-PL" sz="3600" dirty="0" smtClean="0"/>
+              <a:t>tworzyć </a:t>
+            </a:r>
+            <a:r>
+              <a:rPr lang="pl-PL" sz="3600" dirty="0"/>
+              <a:t>oprogramowanie przyrostowo. Po zapoznaniu się </a:t>
+            </a:r>
+            <a:r>
+              <a:rPr lang="pl-PL" sz="3600" dirty="0" smtClean="0"/>
+              <a:t>z rynkiem open-source </a:t>
+            </a:r>
+            <a:r>
+              <a:rPr lang="pl-PL" sz="3600" dirty="0"/>
+              <a:t>użyjemy do tego </a:t>
+            </a:r>
+            <a:r>
+              <a:rPr lang="pl-PL" sz="3600" dirty="0" smtClean="0"/>
+              <a:t>niekomercyjnego narzędzia </a:t>
+            </a:r>
+            <a:r>
+              <a:rPr lang="pl-PL" sz="3600" dirty="0"/>
+              <a:t>do zarzadzania projektem: </a:t>
+            </a:r>
+            <a:r>
+              <a:rPr lang="pl-PL" sz="3600" u="sng" dirty="0">
+                <a:hlinkClick r:id="rId2"/>
+              </a:rPr>
+              <a:t>http://trello.com/</a:t>
+            </a:r>
+            <a:r>
+              <a:rPr lang="pl-PL" sz="3600" dirty="0"/>
+              <a:t>  i </a:t>
+            </a:r>
+            <a:r>
+              <a:rPr lang="pl-PL" sz="3600" dirty="0" smtClean="0"/>
+              <a:t>rozpiszemy </a:t>
+            </a:r>
+            <a:r>
+              <a:rPr lang="pl-PL" sz="3600" dirty="0"/>
+              <a:t>w nim </a:t>
+            </a:r>
+            <a:r>
+              <a:rPr lang="pl-PL" sz="3600" dirty="0" smtClean="0"/>
+              <a:t>zadania </a:t>
+            </a:r>
+            <a:r>
+              <a:rPr lang="pl-PL" sz="3600" dirty="0"/>
+              <a:t>na podstawie wymagań stawianej </a:t>
+            </a:r>
+            <a:r>
+              <a:rPr lang="pl-PL" sz="3600" dirty="0" smtClean="0"/>
+              <a:t>naszej </a:t>
+            </a:r>
+            <a:r>
+              <a:rPr lang="pl-PL" sz="3600" dirty="0"/>
+              <a:t>aplikacji. </a:t>
+            </a:r>
+          </a:p>
+        </p:txBody>
+      </p:sp>
+    </p:spTree>
+    <p:extLst>
+      <p:ext uri="{BB962C8B-B14F-4D97-AF65-F5344CB8AC3E}">
+        <p14:creationId xmlns:p14="http://schemas.microsoft.com/office/powerpoint/2010/main" val="2613727386"/>
+      </p:ext>
+    </p:extLst>
+  </p:cSld>
+  <p:clrMapOvr>
+    <a:masterClrMapping/>
+  </p:clrMapOvr>
+  <p:timing>
+    <p:tnLst>
+      <p:par>
+        <p:cTn id="1" dur="indefinite" restart="never" nodeType="tmRoot"/>
+      </p:par>
+    </p:tnLst>
+  </p:timing>
+</p:sld>
+</file>
+
+<file path=ppt/slides/slide20.xml><?xml version="1.0" encoding="utf-8"?>
 <p:sld xmlns:a="http://schemas.openxmlformats.org/drawingml/2006/main" xmlns:r="http://schemas.openxmlformats.org/officeDocument/2006/relationships" xmlns:p="http://schemas.openxmlformats.org/presentationml/2006/main">
   <p:cSld>
     <p:spTree>
@@ -7316,7 +8745,7 @@
 </p:sld>
 </file>
 
-<file path=ppt/slides/slide15.xml><?xml version="1.0" encoding="utf-8"?>
+<file path=ppt/slides/slide21.xml><?xml version="1.0" encoding="utf-8"?>
 <p:sld xmlns:a="http://schemas.openxmlformats.org/drawingml/2006/main" xmlns:r="http://schemas.openxmlformats.org/officeDocument/2006/relationships" xmlns:p="http://schemas.openxmlformats.org/presentationml/2006/main">
   <p:cSld>
     <p:spTree>
@@ -8317,7 +9746,7 @@
 </p:sld>
 </file>
 
-<file path=ppt/slides/slide16.xml><?xml version="1.0" encoding="utf-8"?>
+<file path=ppt/slides/slide22.xml><?xml version="1.0" encoding="utf-8"?>
 <p:sld xmlns:a="http://schemas.openxmlformats.org/drawingml/2006/main" xmlns:r="http://schemas.openxmlformats.org/officeDocument/2006/relationships" xmlns:p="http://schemas.openxmlformats.org/presentationml/2006/main">
   <p:cSld>
     <p:spTree>
@@ -9349,7 +10778,7 @@
 </p:sld>
 </file>
 
-<file path=ppt/slides/slide17.xml><?xml version="1.0" encoding="utf-8"?>
+<file path=ppt/slides/slide23.xml><?xml version="1.0" encoding="utf-8"?>
 <p:sld xmlns:a="http://schemas.openxmlformats.org/drawingml/2006/main" xmlns:r="http://schemas.openxmlformats.org/officeDocument/2006/relationships" xmlns:p="http://schemas.openxmlformats.org/presentationml/2006/main">
   <p:cSld>
     <p:spTree>
@@ -11126,7 +12555,7 @@
 </p:sld>
 </file>
 
-<file path=ppt/slides/slide18.xml><?xml version="1.0" encoding="utf-8"?>
+<file path=ppt/slides/slide24.xml><?xml version="1.0" encoding="utf-8"?>
 <p:sld xmlns:a="http://schemas.openxmlformats.org/drawingml/2006/main" xmlns:r="http://schemas.openxmlformats.org/officeDocument/2006/relationships" xmlns:p="http://schemas.openxmlformats.org/presentationml/2006/main">
   <p:cSld>
     <p:spTree>
@@ -11204,7 +12633,7 @@
 </p:sld>
 </file>
 
-<file path=ppt/slides/slide19.xml><?xml version="1.0" encoding="utf-8"?>
+<file path=ppt/slides/slide25.xml><?xml version="1.0" encoding="utf-8"?>
 <p:sld xmlns:a="http://schemas.openxmlformats.org/drawingml/2006/main" xmlns:r="http://schemas.openxmlformats.org/officeDocument/2006/relationships" xmlns:p="http://schemas.openxmlformats.org/presentationml/2006/main">
   <p:cSld>
     <p:spTree>
@@ -11468,10 +12897,930 @@
   <p:clrMapOvr>
     <a:masterClrMapping/>
   </p:clrMapOvr>
+  <p:timing>
+    <p:tnLst>
+      <p:par>
+        <p:cTn id="1" dur="indefinite" restart="never" nodeType="tmRoot"/>
+      </p:par>
+    </p:tnLst>
+  </p:timing>
 </p:sld>
 </file>
 
-<file path=ppt/slides/slide2.xml><?xml version="1.0" encoding="utf-8"?>
+<file path=ppt/slides/slide3.xml><?xml version="1.0" encoding="utf-8"?>
+<p:sld xmlns:a="http://schemas.openxmlformats.org/drawingml/2006/main" xmlns:r="http://schemas.openxmlformats.org/officeDocument/2006/relationships" xmlns:p="http://schemas.openxmlformats.org/presentationml/2006/main">
+  <p:cSld>
+    <p:spTree>
+      <p:nvGrpSpPr>
+        <p:cNvPr id="1" name=""/>
+        <p:cNvGrpSpPr/>
+        <p:nvPr/>
+      </p:nvGrpSpPr>
+      <p:grpSpPr>
+        <a:xfrm>
+          <a:off x="0" y="0"/>
+          <a:ext cx="0" cy="0"/>
+          <a:chOff x="0" y="0"/>
+          <a:chExt cx="0" cy="0"/>
+        </a:xfrm>
+      </p:grpSpPr>
+      <p:sp>
+        <p:nvSpPr>
+          <p:cNvPr id="3" name="Symbol zastępczy zawartości 2"/>
+          <p:cNvSpPr>
+            <a:spLocks noGrp="1"/>
+          </p:cNvSpPr>
+          <p:nvPr>
+            <p:ph idx="1"/>
+          </p:nvPr>
+        </p:nvSpPr>
+        <p:spPr>
+          <a:xfrm>
+            <a:off x="1082734" y="152400"/>
+            <a:ext cx="8493860" cy="7315200"/>
+          </a:xfrm>
+        </p:spPr>
+        <p:txBody>
+          <a:bodyPr>
+            <a:normAutofit fontScale="92500" lnSpcReduction="20000"/>
+          </a:bodyPr>
+          <a:lstStyle/>
+          <a:p>
+            <a:pPr marL="0" indent="0" algn="just">
+              <a:buNone/>
+            </a:pPr>
+            <a:r>
+              <a:rPr lang="pl-PL" b="1" dirty="0" smtClean="0"/>
+              <a:t>Wymagania:</a:t>
+            </a:r>
+            <a:endParaRPr lang="pl-PL" b="1" dirty="0"/>
+          </a:p>
+          <a:p>
+            <a:pPr lvl="0" algn="just"/>
+            <a:r>
+              <a:rPr lang="pl-PL" dirty="0"/>
+              <a:t>Użytkownik będzie miał możliwość </a:t>
+            </a:r>
+            <a:r>
+              <a:rPr lang="pl-PL" dirty="0" smtClean="0"/>
+              <a:t>rejestracji i zalogowania </a:t>
+            </a:r>
+            <a:r>
+              <a:rPr lang="pl-PL" dirty="0"/>
+              <a:t>się</a:t>
+            </a:r>
+          </a:p>
+          <a:p>
+            <a:pPr lvl="0" algn="just"/>
+            <a:r>
+              <a:rPr lang="pl-PL" dirty="0"/>
+              <a:t>Użytkownik z odpowiednimi uprawnieniami będzie mógł dodawać ogłoszenia</a:t>
+            </a:r>
+          </a:p>
+          <a:p>
+            <a:pPr lvl="0" algn="just"/>
+            <a:r>
+              <a:rPr lang="pl-PL" dirty="0"/>
+              <a:t>Użytkownik będzie mógł mieć stronę domową (prezentacja firmy)</a:t>
+            </a:r>
+          </a:p>
+          <a:p>
+            <a:pPr lvl="0" algn="just"/>
+            <a:r>
+              <a:rPr lang="pl-PL" dirty="0"/>
+              <a:t>Administrator będzie miał możliwość kontroli nad dodawanymi ofertami</a:t>
+            </a:r>
+          </a:p>
+          <a:p>
+            <a:pPr lvl="0" algn="just"/>
+            <a:r>
+              <a:rPr lang="pl-PL" dirty="0"/>
+              <a:t>Niezalogowany użytkownik będzie miał możliwość wyszukiwania ofert według ustalonych kryteriów (stanowisko/nazwa zawodu, </a:t>
+            </a:r>
+            <a:r>
+              <a:rPr lang="pl-PL" dirty="0" err="1"/>
+              <a:t>tag</a:t>
+            </a:r>
+            <a:r>
+              <a:rPr lang="pl-PL" dirty="0"/>
+              <a:t>, nazwa pracodawcy)</a:t>
+            </a:r>
+          </a:p>
+          <a:p>
+            <a:pPr lvl="0" algn="just"/>
+            <a:r>
+              <a:rPr lang="pl-PL" dirty="0"/>
+              <a:t>Subskrypcje mailowe. (wg stanowisko/nazwa zawodu, </a:t>
+            </a:r>
+            <a:r>
+              <a:rPr lang="pl-PL" dirty="0" err="1"/>
+              <a:t>tag</a:t>
+            </a:r>
+            <a:r>
+              <a:rPr lang="pl-PL" dirty="0"/>
+              <a:t>, nazwa pracodawcy ) </a:t>
+            </a:r>
+          </a:p>
+          <a:p>
+            <a:pPr lvl="0" algn="just"/>
+            <a:r>
+              <a:rPr lang="pl-PL" dirty="0"/>
+              <a:t>Możliwość dodawania ogłoszeń w formacie graficznym (jpg, </a:t>
+            </a:r>
+            <a:r>
+              <a:rPr lang="pl-PL" dirty="0" err="1"/>
+              <a:t>png</a:t>
+            </a:r>
+            <a:r>
+              <a:rPr lang="pl-PL" dirty="0"/>
+              <a:t>,...) oraz pdf.</a:t>
+            </a:r>
+          </a:p>
+          <a:p>
+            <a:pPr lvl="0" algn="just"/>
+            <a:r>
+              <a:rPr lang="pl-PL" dirty="0"/>
+              <a:t>Niezalogowany użytkownik będzie miał możliwość wysyłania swoich zgłoszeń w ramach oferty pracy wraz z </a:t>
+            </a:r>
+            <a:r>
+              <a:rPr lang="pl-PL" dirty="0" err="1"/>
+              <a:t>uploadowaniem</a:t>
+            </a:r>
+            <a:r>
+              <a:rPr lang="pl-PL" dirty="0"/>
+              <a:t> swojego CV bezpośrednio przez formularz kontaktowy na stronie ogłoszenia</a:t>
+            </a:r>
+          </a:p>
+          <a:p>
+            <a:pPr algn="just"/>
+            <a:endParaRPr lang="pl-PL" dirty="0"/>
+          </a:p>
+        </p:txBody>
+      </p:sp>
+    </p:spTree>
+    <p:extLst>
+      <p:ext uri="{BB962C8B-B14F-4D97-AF65-F5344CB8AC3E}">
+        <p14:creationId xmlns:p14="http://schemas.microsoft.com/office/powerpoint/2010/main" val="4220038528"/>
+      </p:ext>
+    </p:extLst>
+  </p:cSld>
+  <p:clrMapOvr>
+    <a:masterClrMapping/>
+  </p:clrMapOvr>
+  <p:timing>
+    <p:tnLst>
+      <p:par>
+        <p:cTn id="1" dur="indefinite" restart="never" nodeType="tmRoot"/>
+      </p:par>
+    </p:tnLst>
+  </p:timing>
+</p:sld>
+</file>
+
+<file path=ppt/slides/slide4.xml><?xml version="1.0" encoding="utf-8"?>
+<p:sld xmlns:a="http://schemas.openxmlformats.org/drawingml/2006/main" xmlns:r="http://schemas.openxmlformats.org/officeDocument/2006/relationships" xmlns:p="http://schemas.openxmlformats.org/presentationml/2006/main">
+  <p:cSld>
+    <p:spTree>
+      <p:nvGrpSpPr>
+        <p:cNvPr id="1" name=""/>
+        <p:cNvGrpSpPr/>
+        <p:nvPr/>
+      </p:nvGrpSpPr>
+      <p:grpSpPr>
+        <a:xfrm>
+          <a:off x="0" y="0"/>
+          <a:ext cx="0" cy="0"/>
+          <a:chOff x="0" y="0"/>
+          <a:chExt cx="0" cy="0"/>
+        </a:xfrm>
+      </p:grpSpPr>
+      <p:sp>
+        <p:nvSpPr>
+          <p:cNvPr id="3" name="Symbol zastępczy zawartości 2"/>
+          <p:cNvSpPr>
+            <a:spLocks noGrp="1"/>
+          </p:cNvSpPr>
+          <p:nvPr>
+            <p:ph idx="1"/>
+          </p:nvPr>
+        </p:nvSpPr>
+        <p:spPr>
+          <a:xfrm>
+            <a:off x="1082734" y="104775"/>
+            <a:ext cx="8493860" cy="1314450"/>
+          </a:xfrm>
+        </p:spPr>
+        <p:txBody>
+          <a:bodyPr>
+            <a:normAutofit fontScale="92500" lnSpcReduction="10000"/>
+          </a:bodyPr>
+          <a:lstStyle/>
+          <a:p>
+            <a:pPr marL="0" lvl="0" indent="0">
+              <a:buNone/>
+            </a:pPr>
+            <a:r>
+              <a:rPr lang="pl-PL" dirty="0" smtClean="0"/>
+              <a:t>Zadanie: Użytkownik </a:t>
+            </a:r>
+            <a:r>
+              <a:rPr lang="pl-PL" dirty="0"/>
+              <a:t>będzie miał możliwość rejestracji i zalogowania </a:t>
+            </a:r>
+            <a:r>
+              <a:rPr lang="pl-PL" dirty="0" smtClean="0"/>
+              <a:t>się przedstawiliśmy w </a:t>
+            </a:r>
+            <a:r>
+              <a:rPr lang="pl-PL" dirty="0" err="1" smtClean="0"/>
+              <a:t>trello</a:t>
+            </a:r>
+            <a:r>
+              <a:rPr lang="pl-PL" dirty="0" smtClean="0"/>
+              <a:t> następująco:</a:t>
+            </a:r>
+          </a:p>
+          <a:p>
+            <a:pPr marL="0" lvl="0" indent="0">
+              <a:buNone/>
+            </a:pPr>
+            <a:r>
+              <a:rPr lang="pl-PL" b="1" dirty="0" smtClean="0"/>
+              <a:t>API:</a:t>
+            </a:r>
+            <a:endParaRPr lang="pl-PL" b="1" dirty="0"/>
+          </a:p>
+        </p:txBody>
+      </p:sp>
+      <p:pic>
+        <p:nvPicPr>
+          <p:cNvPr id="4" name="Obraz 3"/>
+          <p:cNvPicPr>
+            <a:picLocks noChangeAspect="1"/>
+          </p:cNvPicPr>
+          <p:nvPr/>
+        </p:nvPicPr>
+        <p:blipFill>
+          <a:blip r:embed="rId2"/>
+          <a:stretch>
+            <a:fillRect/>
+          </a:stretch>
+        </p:blipFill>
+        <p:spPr>
+          <a:xfrm>
+            <a:off x="2053885" y="1051765"/>
+            <a:ext cx="6551557" cy="6434885"/>
+          </a:xfrm>
+          <a:prstGeom prst="rect">
+            <a:avLst/>
+          </a:prstGeom>
+        </p:spPr>
+      </p:pic>
+    </p:spTree>
+    <p:extLst>
+      <p:ext uri="{BB962C8B-B14F-4D97-AF65-F5344CB8AC3E}">
+        <p14:creationId xmlns:p14="http://schemas.microsoft.com/office/powerpoint/2010/main" val="2296232084"/>
+      </p:ext>
+    </p:extLst>
+  </p:cSld>
+  <p:clrMapOvr>
+    <a:masterClrMapping/>
+  </p:clrMapOvr>
+  <p:timing>
+    <p:tnLst>
+      <p:par>
+        <p:cTn id="1" dur="indefinite" restart="never" nodeType="tmRoot"/>
+      </p:par>
+    </p:tnLst>
+  </p:timing>
+</p:sld>
+</file>
+
+<file path=ppt/slides/slide5.xml><?xml version="1.0" encoding="utf-8"?>
+<p:sld xmlns:a="http://schemas.openxmlformats.org/drawingml/2006/main" xmlns:r="http://schemas.openxmlformats.org/officeDocument/2006/relationships" xmlns:p="http://schemas.openxmlformats.org/presentationml/2006/main">
+  <p:cSld>
+    <p:spTree>
+      <p:nvGrpSpPr>
+        <p:cNvPr id="1" name=""/>
+        <p:cNvGrpSpPr/>
+        <p:nvPr/>
+      </p:nvGrpSpPr>
+      <p:grpSpPr>
+        <a:xfrm>
+          <a:off x="0" y="0"/>
+          <a:ext cx="0" cy="0"/>
+          <a:chOff x="0" y="0"/>
+          <a:chExt cx="0" cy="0"/>
+        </a:xfrm>
+      </p:grpSpPr>
+      <p:sp>
+        <p:nvSpPr>
+          <p:cNvPr id="3" name="Symbol zastępczy zawartości 2"/>
+          <p:cNvSpPr>
+            <a:spLocks noGrp="1"/>
+          </p:cNvSpPr>
+          <p:nvPr>
+            <p:ph idx="1"/>
+          </p:nvPr>
+        </p:nvSpPr>
+        <p:spPr>
+          <a:xfrm>
+            <a:off x="920809" y="120474"/>
+            <a:ext cx="8493860" cy="622476"/>
+          </a:xfrm>
+        </p:spPr>
+        <p:txBody>
+          <a:bodyPr/>
+          <a:lstStyle/>
+          <a:p>
+            <a:pPr marL="0" indent="0">
+              <a:buNone/>
+            </a:pPr>
+            <a:r>
+              <a:rPr lang="pl-PL" dirty="0" smtClean="0"/>
+              <a:t>UI:</a:t>
+            </a:r>
+            <a:endParaRPr lang="pl-PL" dirty="0"/>
+          </a:p>
+        </p:txBody>
+      </p:sp>
+      <p:pic>
+        <p:nvPicPr>
+          <p:cNvPr id="4" name="Obraz 3"/>
+          <p:cNvPicPr>
+            <a:picLocks noChangeAspect="1"/>
+          </p:cNvPicPr>
+          <p:nvPr/>
+        </p:nvPicPr>
+        <p:blipFill>
+          <a:blip r:embed="rId2"/>
+          <a:stretch>
+            <a:fillRect/>
+          </a:stretch>
+        </p:blipFill>
+        <p:spPr>
+          <a:xfrm>
+            <a:off x="1678412" y="1152525"/>
+            <a:ext cx="7293632" cy="5117801"/>
+          </a:xfrm>
+          <a:prstGeom prst="rect">
+            <a:avLst/>
+          </a:prstGeom>
+        </p:spPr>
+      </p:pic>
+    </p:spTree>
+    <p:extLst>
+      <p:ext uri="{BB962C8B-B14F-4D97-AF65-F5344CB8AC3E}">
+        <p14:creationId xmlns:p14="http://schemas.microsoft.com/office/powerpoint/2010/main" val="292310388"/>
+      </p:ext>
+    </p:extLst>
+  </p:cSld>
+  <p:clrMapOvr>
+    <a:masterClrMapping/>
+  </p:clrMapOvr>
+  <p:timing>
+    <p:tnLst>
+      <p:par>
+        <p:cTn id="1" dur="indefinite" restart="never" nodeType="tmRoot"/>
+      </p:par>
+    </p:tnLst>
+  </p:timing>
+</p:sld>
+</file>
+
+<file path=ppt/slides/slide6.xml><?xml version="1.0" encoding="utf-8"?>
+<p:sld xmlns:a="http://schemas.openxmlformats.org/drawingml/2006/main" xmlns:r="http://schemas.openxmlformats.org/officeDocument/2006/relationships" xmlns:p="http://schemas.openxmlformats.org/presentationml/2006/main">
+  <p:cSld>
+    <p:spTree>
+      <p:nvGrpSpPr>
+        <p:cNvPr id="1" name=""/>
+        <p:cNvGrpSpPr/>
+        <p:nvPr/>
+      </p:nvGrpSpPr>
+      <p:grpSpPr>
+        <a:xfrm>
+          <a:off x="0" y="0"/>
+          <a:ext cx="0" cy="0"/>
+          <a:chOff x="0" y="0"/>
+          <a:chExt cx="0" cy="0"/>
+        </a:xfrm>
+      </p:grpSpPr>
+      <p:sp>
+        <p:nvSpPr>
+          <p:cNvPr id="3" name="Symbol zastępczy zawartości 2"/>
+          <p:cNvSpPr>
+            <a:spLocks noGrp="1"/>
+          </p:cNvSpPr>
+          <p:nvPr>
+            <p:ph idx="1"/>
+          </p:nvPr>
+        </p:nvSpPr>
+        <p:spPr>
+          <a:xfrm>
+            <a:off x="1329595" y="76200"/>
+            <a:ext cx="7081044" cy="923925"/>
+          </a:xfrm>
+        </p:spPr>
+        <p:txBody>
+          <a:bodyPr/>
+          <a:lstStyle/>
+          <a:p>
+            <a:pPr marL="0" indent="0">
+              <a:buNone/>
+            </a:pPr>
+            <a:r>
+              <a:rPr lang="pl-PL" dirty="0" smtClean="0"/>
+              <a:t>API:</a:t>
+            </a:r>
+            <a:endParaRPr lang="pl-PL" dirty="0"/>
+          </a:p>
+        </p:txBody>
+      </p:sp>
+      <p:pic>
+        <p:nvPicPr>
+          <p:cNvPr id="4" name="Obraz 3"/>
+          <p:cNvPicPr>
+            <a:picLocks noChangeAspect="1"/>
+          </p:cNvPicPr>
+          <p:nvPr/>
+        </p:nvPicPr>
+        <p:blipFill rotWithShape="1">
+          <a:blip r:embed="rId2"/>
+          <a:srcRect b="67680"/>
+          <a:stretch/>
+        </p:blipFill>
+        <p:spPr>
+          <a:xfrm>
+            <a:off x="1329595" y="1332275"/>
+            <a:ext cx="6847619" cy="1877650"/>
+          </a:xfrm>
+          <a:prstGeom prst="rect">
+            <a:avLst/>
+          </a:prstGeom>
+        </p:spPr>
+      </p:pic>
+      <p:pic>
+        <p:nvPicPr>
+          <p:cNvPr id="5" name="Obraz 4"/>
+          <p:cNvPicPr>
+            <a:picLocks noChangeAspect="1"/>
+          </p:cNvPicPr>
+          <p:nvPr/>
+        </p:nvPicPr>
+        <p:blipFill rotWithShape="1">
+          <a:blip r:embed="rId3"/>
+          <a:srcRect b="56660"/>
+          <a:stretch/>
+        </p:blipFill>
+        <p:spPr>
+          <a:xfrm>
+            <a:off x="1329595" y="4894546"/>
+            <a:ext cx="6800000" cy="1972979"/>
+          </a:xfrm>
+          <a:prstGeom prst="rect">
+            <a:avLst/>
+          </a:prstGeom>
+        </p:spPr>
+      </p:pic>
+      <p:sp>
+        <p:nvSpPr>
+          <p:cNvPr id="6" name="Symbol zastępczy zawartości 2"/>
+          <p:cNvSpPr txBox="1">
+            <a:spLocks/>
+          </p:cNvSpPr>
+          <p:nvPr/>
+        </p:nvSpPr>
+        <p:spPr>
+          <a:xfrm>
+            <a:off x="1377214" y="3542075"/>
+            <a:ext cx="7081044" cy="923925"/>
+          </a:xfrm>
+          <a:prstGeom prst="rect">
+            <a:avLst/>
+          </a:prstGeom>
+        </p:spPr>
+        <p:txBody>
+          <a:bodyPr vert="horz" lIns="91440" tIns="45720" rIns="91440" bIns="45720" rtlCol="0" anchor="ctr">
+            <a:normAutofit/>
+          </a:bodyPr>
+          <a:lstStyle>
+            <a:lvl1pPr marL="314982" indent="-314982" algn="l" defTabSz="503972" rtl="0" eaLnBrk="1" latinLnBrk="0" hangingPunct="1">
+              <a:spcBef>
+                <a:spcPct val="20000"/>
+              </a:spcBef>
+              <a:spcAft>
+                <a:spcPts val="661"/>
+              </a:spcAft>
+              <a:buClr>
+                <a:schemeClr val="accent1">
+                  <a:lumMod val="75000"/>
+                </a:schemeClr>
+              </a:buClr>
+              <a:buSzPct val="145000"/>
+              <a:buFont typeface="Arial"/>
+              <a:buChar char="•"/>
+              <a:defRPr sz="2646" kern="1200" cap="none">
+                <a:solidFill>
+                  <a:schemeClr val="tx1"/>
+                </a:solidFill>
+                <a:effectLst/>
+                <a:latin typeface="+mn-lt"/>
+                <a:ea typeface="+mn-ea"/>
+                <a:cs typeface="+mn-cs"/>
+              </a:defRPr>
+            </a:lvl1pPr>
+            <a:lvl2pPr marL="818954" indent="-314982" algn="l" defTabSz="503972" rtl="0" eaLnBrk="1" latinLnBrk="0" hangingPunct="1">
+              <a:spcBef>
+                <a:spcPct val="20000"/>
+              </a:spcBef>
+              <a:spcAft>
+                <a:spcPts val="661"/>
+              </a:spcAft>
+              <a:buClr>
+                <a:schemeClr val="accent1">
+                  <a:lumMod val="75000"/>
+                </a:schemeClr>
+              </a:buClr>
+              <a:buSzPct val="145000"/>
+              <a:buFont typeface="Arial"/>
+              <a:buChar char="•"/>
+              <a:defRPr sz="2205" kern="1200" cap="none">
+                <a:solidFill>
+                  <a:schemeClr val="tx1"/>
+                </a:solidFill>
+                <a:effectLst/>
+                <a:latin typeface="+mn-lt"/>
+                <a:ea typeface="+mn-ea"/>
+                <a:cs typeface="+mn-cs"/>
+              </a:defRPr>
+            </a:lvl2pPr>
+            <a:lvl3pPr marL="1322925" indent="-314982" algn="l" defTabSz="503972" rtl="0" eaLnBrk="1" latinLnBrk="0" hangingPunct="1">
+              <a:spcBef>
+                <a:spcPct val="20000"/>
+              </a:spcBef>
+              <a:spcAft>
+                <a:spcPts val="661"/>
+              </a:spcAft>
+              <a:buClr>
+                <a:schemeClr val="accent1">
+                  <a:lumMod val="75000"/>
+                </a:schemeClr>
+              </a:buClr>
+              <a:buSzPct val="145000"/>
+              <a:buFont typeface="Arial"/>
+              <a:buChar char="•"/>
+              <a:defRPr sz="1984" kern="1200" cap="none">
+                <a:solidFill>
+                  <a:schemeClr val="tx1"/>
+                </a:solidFill>
+                <a:effectLst/>
+                <a:latin typeface="+mn-lt"/>
+                <a:ea typeface="+mn-ea"/>
+                <a:cs typeface="+mn-cs"/>
+              </a:defRPr>
+            </a:lvl3pPr>
+            <a:lvl4pPr marL="1700904" indent="-188989" algn="l" defTabSz="503972" rtl="0" eaLnBrk="1" latinLnBrk="0" hangingPunct="1">
+              <a:spcBef>
+                <a:spcPct val="20000"/>
+              </a:spcBef>
+              <a:spcAft>
+                <a:spcPts val="661"/>
+              </a:spcAft>
+              <a:buClr>
+                <a:schemeClr val="accent1">
+                  <a:lumMod val="75000"/>
+                </a:schemeClr>
+              </a:buClr>
+              <a:buSzPct val="145000"/>
+              <a:buFont typeface="Arial"/>
+              <a:buChar char="•"/>
+              <a:defRPr sz="1764" kern="1200" cap="none">
+                <a:solidFill>
+                  <a:schemeClr val="tx1"/>
+                </a:solidFill>
+                <a:effectLst/>
+                <a:latin typeface="+mn-lt"/>
+                <a:ea typeface="+mn-ea"/>
+                <a:cs typeface="+mn-cs"/>
+              </a:defRPr>
+            </a:lvl4pPr>
+            <a:lvl5pPr marL="2204876" indent="-188989" algn="l" defTabSz="503972" rtl="0" eaLnBrk="1" latinLnBrk="0" hangingPunct="1">
+              <a:spcBef>
+                <a:spcPct val="20000"/>
+              </a:spcBef>
+              <a:spcAft>
+                <a:spcPts val="661"/>
+              </a:spcAft>
+              <a:buClr>
+                <a:schemeClr val="accent1">
+                  <a:lumMod val="75000"/>
+                </a:schemeClr>
+              </a:buClr>
+              <a:buSzPct val="145000"/>
+              <a:buFont typeface="Arial"/>
+              <a:buChar char="•"/>
+              <a:defRPr sz="1543" kern="1200" cap="none">
+                <a:solidFill>
+                  <a:schemeClr val="tx1"/>
+                </a:solidFill>
+                <a:effectLst/>
+                <a:latin typeface="+mn-lt"/>
+                <a:ea typeface="+mn-ea"/>
+                <a:cs typeface="+mn-cs"/>
+              </a:defRPr>
+            </a:lvl5pPr>
+            <a:lvl6pPr marL="2771844" indent="-251986" algn="l" defTabSz="503972" rtl="0" eaLnBrk="1" latinLnBrk="0" hangingPunct="1">
+              <a:spcBef>
+                <a:spcPct val="20000"/>
+              </a:spcBef>
+              <a:spcAft>
+                <a:spcPts val="661"/>
+              </a:spcAft>
+              <a:buClr>
+                <a:schemeClr val="accent1">
+                  <a:lumMod val="75000"/>
+                </a:schemeClr>
+              </a:buClr>
+              <a:buSzPct val="145000"/>
+              <a:buFont typeface="Arial"/>
+              <a:buChar char="•"/>
+              <a:defRPr sz="1543" kern="1200" cap="none">
+                <a:solidFill>
+                  <a:schemeClr val="tx1"/>
+                </a:solidFill>
+                <a:effectLst/>
+                <a:latin typeface="+mn-lt"/>
+                <a:ea typeface="+mn-ea"/>
+                <a:cs typeface="+mn-cs"/>
+              </a:defRPr>
+            </a:lvl6pPr>
+            <a:lvl7pPr marL="3275815" indent="-251986" algn="l" defTabSz="503972" rtl="0" eaLnBrk="1" latinLnBrk="0" hangingPunct="1">
+              <a:spcBef>
+                <a:spcPct val="20000"/>
+              </a:spcBef>
+              <a:spcAft>
+                <a:spcPts val="661"/>
+              </a:spcAft>
+              <a:buClr>
+                <a:schemeClr val="accent1">
+                  <a:lumMod val="75000"/>
+                </a:schemeClr>
+              </a:buClr>
+              <a:buSzPct val="145000"/>
+              <a:buFont typeface="Arial"/>
+              <a:buChar char="•"/>
+              <a:defRPr sz="1543" kern="1200" cap="none">
+                <a:solidFill>
+                  <a:schemeClr val="tx1"/>
+                </a:solidFill>
+                <a:effectLst/>
+                <a:latin typeface="+mn-lt"/>
+                <a:ea typeface="+mn-ea"/>
+                <a:cs typeface="+mn-cs"/>
+              </a:defRPr>
+            </a:lvl7pPr>
+            <a:lvl8pPr marL="3779787" indent="-251986" algn="l" defTabSz="503972" rtl="0" eaLnBrk="1" latinLnBrk="0" hangingPunct="1">
+              <a:spcBef>
+                <a:spcPct val="20000"/>
+              </a:spcBef>
+              <a:spcAft>
+                <a:spcPts val="661"/>
+              </a:spcAft>
+              <a:buClr>
+                <a:schemeClr val="accent1">
+                  <a:lumMod val="75000"/>
+                </a:schemeClr>
+              </a:buClr>
+              <a:buSzPct val="145000"/>
+              <a:buFont typeface="Arial"/>
+              <a:buChar char="•"/>
+              <a:defRPr sz="1543" kern="1200" cap="none">
+                <a:solidFill>
+                  <a:schemeClr val="tx1"/>
+                </a:solidFill>
+                <a:effectLst/>
+                <a:latin typeface="+mn-lt"/>
+                <a:ea typeface="+mn-ea"/>
+                <a:cs typeface="+mn-cs"/>
+              </a:defRPr>
+            </a:lvl8pPr>
+            <a:lvl9pPr marL="4283758" indent="-251986" algn="l" defTabSz="503972" rtl="0" eaLnBrk="1" latinLnBrk="0" hangingPunct="1">
+              <a:spcBef>
+                <a:spcPct val="20000"/>
+              </a:spcBef>
+              <a:spcAft>
+                <a:spcPts val="661"/>
+              </a:spcAft>
+              <a:buClr>
+                <a:schemeClr val="accent1">
+                  <a:lumMod val="75000"/>
+                </a:schemeClr>
+              </a:buClr>
+              <a:buSzPct val="145000"/>
+              <a:buFont typeface="Arial"/>
+              <a:buChar char="•"/>
+              <a:defRPr sz="1543" kern="1200" cap="none">
+                <a:solidFill>
+                  <a:schemeClr val="tx1"/>
+                </a:solidFill>
+                <a:effectLst/>
+                <a:latin typeface="+mn-lt"/>
+                <a:ea typeface="+mn-ea"/>
+                <a:cs typeface="+mn-cs"/>
+              </a:defRPr>
+            </a:lvl9pPr>
+          </a:lstStyle>
+          <a:p>
+            <a:pPr marL="0" indent="0">
+              <a:buFont typeface="Arial"/>
+              <a:buNone/>
+            </a:pPr>
+            <a:r>
+              <a:rPr lang="pl-PL" dirty="0" smtClean="0"/>
+              <a:t>UI:</a:t>
+            </a:r>
+            <a:endParaRPr lang="pl-PL" dirty="0"/>
+          </a:p>
+        </p:txBody>
+      </p:sp>
+    </p:spTree>
+    <p:extLst>
+      <p:ext uri="{BB962C8B-B14F-4D97-AF65-F5344CB8AC3E}">
+        <p14:creationId xmlns:p14="http://schemas.microsoft.com/office/powerpoint/2010/main" val="3109488807"/>
+      </p:ext>
+    </p:extLst>
+  </p:cSld>
+  <p:clrMapOvr>
+    <a:masterClrMapping/>
+  </p:clrMapOvr>
+  <p:timing>
+    <p:tnLst>
+      <p:par>
+        <p:cTn id="1" dur="indefinite" restart="never" nodeType="tmRoot"/>
+      </p:par>
+    </p:tnLst>
+  </p:timing>
+</p:sld>
+</file>
+
+<file path=ppt/slides/slide7.xml><?xml version="1.0" encoding="utf-8"?>
+<p:sld xmlns:a="http://schemas.openxmlformats.org/drawingml/2006/main" xmlns:r="http://schemas.openxmlformats.org/officeDocument/2006/relationships" xmlns:p="http://schemas.openxmlformats.org/presentationml/2006/main">
+  <p:cSld>
+    <p:spTree>
+      <p:nvGrpSpPr>
+        <p:cNvPr id="1" name=""/>
+        <p:cNvGrpSpPr/>
+        <p:nvPr/>
+      </p:nvGrpSpPr>
+      <p:grpSpPr>
+        <a:xfrm>
+          <a:off x="0" y="0"/>
+          <a:ext cx="0" cy="0"/>
+          <a:chOff x="0" y="0"/>
+          <a:chExt cx="0" cy="0"/>
+        </a:xfrm>
+      </p:grpSpPr>
+      <p:sp>
+        <p:nvSpPr>
+          <p:cNvPr id="3" name="Symbol zastępczy zawartości 2"/>
+          <p:cNvSpPr>
+            <a:spLocks noGrp="1"/>
+          </p:cNvSpPr>
+          <p:nvPr>
+            <p:ph idx="1"/>
+          </p:nvPr>
+        </p:nvSpPr>
+        <p:spPr>
+          <a:xfrm>
+            <a:off x="1082734" y="333375"/>
+            <a:ext cx="8493860" cy="7067550"/>
+          </a:xfrm>
+        </p:spPr>
+        <p:txBody>
+          <a:bodyPr/>
+          <a:lstStyle/>
+          <a:p>
+            <a:pPr marL="0" indent="0" algn="just">
+              <a:buNone/>
+            </a:pPr>
+            <a:r>
+              <a:rPr lang="pl-PL" dirty="0" smtClean="0"/>
+              <a:t>Rozpisywanie wszystkich zadań w ten sposób pozwoliło nam jednocześnie pracować nad tym samym zadaniem niezależnie od siebie. Często projekt i zespół który ma go realizować wymaga specjalnego podejścia jeśli chodzi o rozpisywanie zadań i nie da się tutaj wyznaczyć odgórnych standardów.</a:t>
+            </a:r>
+          </a:p>
+          <a:p>
+            <a:pPr marL="0" indent="0" algn="just">
+              <a:buNone/>
+            </a:pPr>
+            <a:r>
+              <a:rPr lang="pl-PL" dirty="0" smtClean="0"/>
+              <a:t>Zastosowaliśmy również podejście pracy z repozytorium z wykorzystaniem git-</a:t>
+            </a:r>
+            <a:r>
+              <a:rPr lang="pl-PL" dirty="0" err="1" smtClean="0"/>
+              <a:t>flow</a:t>
+            </a:r>
+            <a:r>
+              <a:rPr lang="pl-PL" dirty="0" smtClean="0"/>
+              <a:t> które to wspiera tworzenie dużej ilości </a:t>
+            </a:r>
+            <a:r>
+              <a:rPr lang="pl-PL" dirty="0" err="1" smtClean="0"/>
+              <a:t>branch</a:t>
+            </a:r>
+            <a:r>
+              <a:rPr lang="pl-PL" dirty="0" smtClean="0"/>
+              <a:t>-y na każdą funkcjonalność. Każdy programista tworzy swojego Feature </a:t>
+            </a:r>
+            <a:r>
+              <a:rPr lang="pl-PL" dirty="0" err="1" smtClean="0"/>
+              <a:t>brancha</a:t>
+            </a:r>
+            <a:r>
+              <a:rPr lang="pl-PL" dirty="0" smtClean="0"/>
+              <a:t> z </a:t>
+            </a:r>
+            <a:r>
+              <a:rPr lang="pl-PL" dirty="0" err="1" smtClean="0"/>
+              <a:t>brancha</a:t>
+            </a:r>
+            <a:r>
+              <a:rPr lang="pl-PL" dirty="0" smtClean="0"/>
+              <a:t> </a:t>
+            </a:r>
+            <a:r>
+              <a:rPr lang="pl-PL" dirty="0" err="1" smtClean="0"/>
+              <a:t>develop</a:t>
+            </a:r>
+            <a:r>
+              <a:rPr lang="pl-PL" dirty="0" smtClean="0"/>
+              <a:t> na którym znajduje się aktualna wersja developerska. Działające wersje aplikacji znajdują się na </a:t>
+            </a:r>
+            <a:r>
+              <a:rPr lang="pl-PL" dirty="0" err="1" smtClean="0"/>
+              <a:t>branch</a:t>
+            </a:r>
+            <a:r>
+              <a:rPr lang="pl-PL" dirty="0" smtClean="0"/>
+              <a:t>-u master.  Na rynku istnieje wiele narzędzi wspierające taką prace z git-em </a:t>
+            </a:r>
+            <a:r>
+              <a:rPr lang="pl-PL" dirty="0" err="1" smtClean="0"/>
+              <a:t>jedym</a:t>
+            </a:r>
+            <a:r>
+              <a:rPr lang="pl-PL" dirty="0" smtClean="0"/>
+              <a:t> z nich jest darmowe narzędzie </a:t>
+            </a:r>
+            <a:r>
+              <a:rPr lang="pl-PL" dirty="0" err="1" smtClean="0"/>
+              <a:t>SourceTree</a:t>
+            </a:r>
+            <a:r>
+              <a:rPr lang="pl-PL" dirty="0" smtClean="0"/>
+              <a:t> które w dużym stopniu upraszcza proces tworzenia i </a:t>
+            </a:r>
+            <a:r>
+              <a:rPr lang="pl-PL" dirty="0" err="1" smtClean="0"/>
+              <a:t>merge-wania</a:t>
+            </a:r>
+            <a:r>
+              <a:rPr lang="pl-PL" dirty="0" smtClean="0"/>
+              <a:t> </a:t>
+            </a:r>
+            <a:r>
+              <a:rPr lang="pl-PL" dirty="0" err="1" smtClean="0"/>
+              <a:t>branch</a:t>
+            </a:r>
+            <a:r>
+              <a:rPr lang="pl-PL" dirty="0" smtClean="0"/>
+              <a:t>-y.</a:t>
+            </a:r>
+            <a:endParaRPr lang="pl-PL" dirty="0"/>
+          </a:p>
+        </p:txBody>
+      </p:sp>
+    </p:spTree>
+    <p:extLst>
+      <p:ext uri="{BB962C8B-B14F-4D97-AF65-F5344CB8AC3E}">
+        <p14:creationId xmlns:p14="http://schemas.microsoft.com/office/powerpoint/2010/main" val="2564183869"/>
+      </p:ext>
+    </p:extLst>
+  </p:cSld>
+  <p:clrMapOvr>
+    <a:masterClrMapping/>
+  </p:clrMapOvr>
+  <p:timing>
+    <p:tnLst>
+      <p:par>
+        <p:cTn id="1" dur="indefinite" restart="never" nodeType="tmRoot"/>
+      </p:par>
+    </p:tnLst>
+  </p:timing>
+</p:sld>
+</file>
+
+<file path=ppt/slides/slide8.xml><?xml version="1.0" encoding="utf-8"?>
 <p:sld xmlns:a="http://schemas.openxmlformats.org/drawingml/2006/main" xmlns:r="http://schemas.openxmlformats.org/officeDocument/2006/relationships" xmlns:p="http://schemas.openxmlformats.org/presentationml/2006/main">
   <p:cSld>
     <p:spTree>
@@ -11552,669 +13901,13 @@
   <p:clrMapOvr>
     <a:masterClrMapping/>
   </p:clrMapOvr>
-</p:sld>
-</file>
-
-<file path=ppt/slides/slide3.xml><?xml version="1.0" encoding="utf-8"?>
-<p:sld xmlns:a="http://schemas.openxmlformats.org/drawingml/2006/main" xmlns:r="http://schemas.openxmlformats.org/officeDocument/2006/relationships" xmlns:p="http://schemas.openxmlformats.org/presentationml/2006/main">
-  <p:cSld>
-    <p:spTree>
-      <p:nvGrpSpPr>
-        <p:cNvPr id="1" name=""/>
-        <p:cNvGrpSpPr/>
-        <p:nvPr/>
-      </p:nvGrpSpPr>
-      <p:grpSpPr>
-        <a:xfrm>
-          <a:off x="0" y="0"/>
-          <a:ext cx="0" cy="0"/>
-          <a:chOff x="0" y="0"/>
-          <a:chExt cx="0" cy="0"/>
-        </a:xfrm>
-      </p:grpSpPr>
-      <p:sp>
-        <p:nvSpPr>
-          <p:cNvPr id="2" name="Tytuł 1"/>
-          <p:cNvSpPr>
-            <a:spLocks noGrp="1"/>
-          </p:cNvSpPr>
-          <p:nvPr>
-            <p:ph type="title"/>
-          </p:nvPr>
-        </p:nvSpPr>
-        <p:spPr>
-          <a:xfrm>
-            <a:off x="235390" y="368177"/>
-            <a:ext cx="9723421" cy="2183906"/>
-          </a:xfrm>
-        </p:spPr>
-        <p:txBody>
-          <a:bodyPr/>
-          <a:lstStyle/>
-          <a:p>
-            <a:r>
-              <a:rPr lang="pl-PL" dirty="0"/>
-              <a:t>W ramach poszczególnych kart </a:t>
-            </a:r>
-            <a:r>
-              <a:rPr lang="pl-PL" dirty="0" smtClean="0"/>
-              <a:t>możemy:</a:t>
-            </a:r>
-            <a:r>
-              <a:rPr lang="pl-PL" dirty="0"/>
-              <a:t/>
-            </a:r>
-            <a:br>
-              <a:rPr lang="pl-PL" dirty="0"/>
-            </a:br>
-            <a:endParaRPr lang="pl-PL" dirty="0"/>
-          </a:p>
-        </p:txBody>
-      </p:sp>
-      <p:sp>
-        <p:nvSpPr>
-          <p:cNvPr id="3" name="Symbol zastępczy zawartości 2"/>
-          <p:cNvSpPr>
-            <a:spLocks noGrp="1"/>
-          </p:cNvSpPr>
-          <p:nvPr>
-            <p:ph idx="1"/>
-          </p:nvPr>
-        </p:nvSpPr>
-        <p:spPr>
-          <a:xfrm>
-            <a:off x="1082734" y="1901228"/>
-            <a:ext cx="8493860" cy="4712458"/>
-          </a:xfrm>
-        </p:spPr>
-        <p:txBody>
-          <a:bodyPr>
-            <a:normAutofit/>
-          </a:bodyPr>
-          <a:lstStyle/>
-          <a:p>
-            <a:r>
-              <a:rPr lang="pl-PL" dirty="0" smtClean="0"/>
-              <a:t>dodać </a:t>
-            </a:r>
-            <a:r>
-              <a:rPr lang="pl-PL" dirty="0"/>
-              <a:t>opis</a:t>
-            </a:r>
-          </a:p>
-          <a:p>
-            <a:r>
-              <a:rPr lang="pl-PL" dirty="0"/>
-              <a:t>napisać komentarz</a:t>
-            </a:r>
-          </a:p>
-          <a:p>
-            <a:r>
-              <a:rPr lang="pl-PL" dirty="0"/>
-              <a:t>tagować za pomocą kolorów i krótkich opisów</a:t>
-            </a:r>
-          </a:p>
-          <a:p>
-            <a:r>
-              <a:rPr lang="pl-PL" dirty="0"/>
-              <a:t>określać termin (deadline)</a:t>
-            </a:r>
-          </a:p>
-          <a:p>
-            <a:r>
-              <a:rPr lang="pl-PL" dirty="0"/>
-              <a:t>głosować na daną kartę</a:t>
-            </a:r>
-          </a:p>
-          <a:p>
-            <a:r>
-              <a:rPr lang="pl-PL" dirty="0"/>
-              <a:t>dodawać </a:t>
-            </a:r>
-            <a:r>
-              <a:rPr lang="pl-PL" dirty="0" err="1" smtClean="0"/>
-              <a:t>checklisty</a:t>
-            </a:r>
-            <a:r>
-              <a:rPr lang="pl-PL" dirty="0" smtClean="0"/>
-              <a:t> </a:t>
-            </a:r>
-            <a:r>
-              <a:rPr lang="pl-PL" dirty="0"/>
-              <a:t>oraz pliki pochodzące bezpośrednio z naszego komputera, jak i serwisów takich jak </a:t>
-            </a:r>
-            <a:r>
-              <a:rPr lang="pl-PL" i="1" dirty="0" err="1"/>
-              <a:t>Dropbox</a:t>
-            </a:r>
-            <a:endParaRPr lang="pl-PL" i="1" dirty="0"/>
-          </a:p>
-          <a:p>
-            <a:endParaRPr lang="pl-PL" dirty="0"/>
-          </a:p>
-        </p:txBody>
-      </p:sp>
-    </p:spTree>
-    <p:extLst>
-      <p:ext uri="{BB962C8B-B14F-4D97-AF65-F5344CB8AC3E}">
-        <p14:creationId xmlns:p14="http://schemas.microsoft.com/office/powerpoint/2010/main" val="117598279"/>
-      </p:ext>
-    </p:extLst>
-  </p:cSld>
-  <p:clrMapOvr>
-    <a:masterClrMapping/>
-  </p:clrMapOvr>
-</p:sld>
-</file>
-
-<file path=ppt/slides/slide4.xml><?xml version="1.0" encoding="utf-8"?>
-<p:sld xmlns:a="http://schemas.openxmlformats.org/drawingml/2006/main" xmlns:r="http://schemas.openxmlformats.org/officeDocument/2006/relationships" xmlns:p="http://schemas.openxmlformats.org/presentationml/2006/main">
-  <p:cSld>
-    <p:spTree>
-      <p:nvGrpSpPr>
-        <p:cNvPr id="1" name=""/>
-        <p:cNvGrpSpPr/>
-        <p:nvPr/>
-      </p:nvGrpSpPr>
-      <p:grpSpPr>
-        <a:xfrm>
-          <a:off x="0" y="0"/>
-          <a:ext cx="0" cy="0"/>
-          <a:chOff x="0" y="0"/>
-          <a:chExt cx="0" cy="0"/>
-        </a:xfrm>
-      </p:grpSpPr>
-      <p:sp>
-        <p:nvSpPr>
-          <p:cNvPr id="2" name="Tytuł 1"/>
-          <p:cNvSpPr>
-            <a:spLocks noGrp="1"/>
-          </p:cNvSpPr>
-          <p:nvPr>
-            <p:ph type="title"/>
-          </p:nvPr>
-        </p:nvSpPr>
-        <p:spPr/>
-        <p:txBody>
-          <a:bodyPr/>
-          <a:lstStyle/>
-          <a:p>
-            <a:endParaRPr lang="pl-PL"/>
-          </a:p>
-        </p:txBody>
-      </p:sp>
-      <p:pic>
-        <p:nvPicPr>
-          <p:cNvPr id="4" name="image02.png"/>
-          <p:cNvPicPr>
-            <a:picLocks noGrp="1"/>
-          </p:cNvPicPr>
-          <p:nvPr>
-            <p:ph idx="1"/>
-          </p:nvPr>
-        </p:nvPicPr>
-        <p:blipFill>
-          <a:blip r:embed="rId2"/>
-          <a:srcRect/>
-          <a:stretch>
-            <a:fillRect/>
-          </a:stretch>
-        </p:blipFill>
-        <p:spPr>
-          <a:xfrm>
-            <a:off x="1744492" y="576407"/>
-            <a:ext cx="7007380" cy="6639205"/>
-          </a:xfrm>
-          <a:prstGeom prst="rect">
-            <a:avLst/>
-          </a:prstGeom>
-          <a:ln/>
-        </p:spPr>
-      </p:pic>
-    </p:spTree>
-    <p:extLst>
-      <p:ext uri="{BB962C8B-B14F-4D97-AF65-F5344CB8AC3E}">
-        <p14:creationId xmlns:p14="http://schemas.microsoft.com/office/powerpoint/2010/main" val="1999163763"/>
-      </p:ext>
-    </p:extLst>
-  </p:cSld>
-  <p:clrMapOvr>
-    <a:masterClrMapping/>
-  </p:clrMapOvr>
-</p:sld>
-</file>
-
-<file path=ppt/slides/slide5.xml><?xml version="1.0" encoding="utf-8"?>
-<p:sld xmlns:a="http://schemas.openxmlformats.org/drawingml/2006/main" xmlns:r="http://schemas.openxmlformats.org/officeDocument/2006/relationships" xmlns:p="http://schemas.openxmlformats.org/presentationml/2006/main">
-  <p:cSld>
-    <p:spTree>
-      <p:nvGrpSpPr>
-        <p:cNvPr id="1" name=""/>
-        <p:cNvGrpSpPr/>
-        <p:nvPr/>
-      </p:nvGrpSpPr>
-      <p:grpSpPr>
-        <a:xfrm>
-          <a:off x="0" y="0"/>
-          <a:ext cx="0" cy="0"/>
-          <a:chOff x="0" y="0"/>
-          <a:chExt cx="0" cy="0"/>
-        </a:xfrm>
-      </p:grpSpPr>
-      <p:sp>
-        <p:nvSpPr>
-          <p:cNvPr id="2" name="Tytuł 1"/>
-          <p:cNvSpPr>
-            <a:spLocks noGrp="1"/>
-          </p:cNvSpPr>
-          <p:nvPr>
-            <p:ph type="title"/>
-          </p:nvPr>
-        </p:nvSpPr>
-        <p:spPr/>
-        <p:txBody>
-          <a:bodyPr/>
-          <a:lstStyle/>
-          <a:p>
-            <a:endParaRPr lang="pl-PL"/>
-          </a:p>
-        </p:txBody>
-      </p:sp>
-      <p:pic>
-        <p:nvPicPr>
-          <p:cNvPr id="4" name="Symbol zastępczy zawartości 3"/>
-          <p:cNvPicPr>
-            <a:picLocks noGrp="1" noChangeAspect="1"/>
-          </p:cNvPicPr>
-          <p:nvPr>
-            <p:ph idx="1"/>
-          </p:nvPr>
-        </p:nvPicPr>
-        <p:blipFill>
-          <a:blip r:embed="rId2"/>
-          <a:stretch>
-            <a:fillRect/>
-          </a:stretch>
-        </p:blipFill>
-        <p:spPr>
-          <a:xfrm>
-            <a:off x="2139073" y="104522"/>
-            <a:ext cx="6543199" cy="7387190"/>
-          </a:xfrm>
-          <a:prstGeom prst="rect">
-            <a:avLst/>
-          </a:prstGeom>
-        </p:spPr>
-      </p:pic>
-    </p:spTree>
-    <p:extLst>
-      <p:ext uri="{BB962C8B-B14F-4D97-AF65-F5344CB8AC3E}">
-        <p14:creationId xmlns:p14="http://schemas.microsoft.com/office/powerpoint/2010/main" val="3448912205"/>
-      </p:ext>
-    </p:extLst>
-  </p:cSld>
-  <p:clrMapOvr>
-    <a:masterClrMapping/>
-  </p:clrMapOvr>
-</p:sld>
-</file>
-
-<file path=ppt/slides/slide6.xml><?xml version="1.0" encoding="utf-8"?>
-<p:sld xmlns:a="http://schemas.openxmlformats.org/drawingml/2006/main" xmlns:r="http://schemas.openxmlformats.org/officeDocument/2006/relationships" xmlns:p="http://schemas.openxmlformats.org/presentationml/2006/main">
-  <p:cSld>
-    <p:spTree>
-      <p:nvGrpSpPr>
-        <p:cNvPr id="1" name=""/>
-        <p:cNvGrpSpPr/>
-        <p:nvPr/>
-      </p:nvGrpSpPr>
-      <p:grpSpPr>
-        <a:xfrm>
-          <a:off x="0" y="0"/>
-          <a:ext cx="0" cy="0"/>
-          <a:chOff x="0" y="0"/>
-          <a:chExt cx="0" cy="0"/>
-        </a:xfrm>
-      </p:grpSpPr>
-      <p:sp>
-        <p:nvSpPr>
-          <p:cNvPr id="2" name="Tytuł 1"/>
-          <p:cNvSpPr>
-            <a:spLocks noGrp="1"/>
-          </p:cNvSpPr>
-          <p:nvPr>
-            <p:ph type="title"/>
-          </p:nvPr>
-        </p:nvSpPr>
-        <p:spPr/>
-        <p:txBody>
-          <a:bodyPr/>
-          <a:lstStyle/>
-          <a:p>
-            <a:endParaRPr lang="pl-PL"/>
-          </a:p>
-        </p:txBody>
-      </p:sp>
-      <p:sp>
-        <p:nvSpPr>
-          <p:cNvPr id="3" name="Symbol zastępczy zawartości 2"/>
-          <p:cNvSpPr>
-            <a:spLocks noGrp="1"/>
-          </p:cNvSpPr>
-          <p:nvPr>
-            <p:ph idx="1"/>
-          </p:nvPr>
-        </p:nvSpPr>
-        <p:spPr/>
-        <p:txBody>
-          <a:bodyPr/>
-          <a:lstStyle/>
-          <a:p>
-            <a:endParaRPr lang="pl-PL"/>
-          </a:p>
-        </p:txBody>
-      </p:sp>
-      <p:pic>
-        <p:nvPicPr>
-          <p:cNvPr id="4" name="Obraz 3"/>
-          <p:cNvPicPr>
-            <a:picLocks noChangeAspect="1"/>
-          </p:cNvPicPr>
-          <p:nvPr/>
-        </p:nvPicPr>
-        <p:blipFill>
-          <a:blip r:embed="rId2"/>
-          <a:stretch>
-            <a:fillRect/>
-          </a:stretch>
-        </p:blipFill>
-        <p:spPr>
-          <a:xfrm>
-            <a:off x="1518354" y="98626"/>
-            <a:ext cx="7622619" cy="7390028"/>
-          </a:xfrm>
-          <a:prstGeom prst="rect">
-            <a:avLst/>
-          </a:prstGeom>
-        </p:spPr>
-      </p:pic>
-    </p:spTree>
-    <p:extLst>
-      <p:ext uri="{BB962C8B-B14F-4D97-AF65-F5344CB8AC3E}">
-        <p14:creationId xmlns:p14="http://schemas.microsoft.com/office/powerpoint/2010/main" val="1456673731"/>
-      </p:ext>
-    </p:extLst>
-  </p:cSld>
-  <p:clrMapOvr>
-    <a:masterClrMapping/>
-  </p:clrMapOvr>
-</p:sld>
-</file>
-
-<file path=ppt/slides/slide7.xml><?xml version="1.0" encoding="utf-8"?>
-<p:sld xmlns:a="http://schemas.openxmlformats.org/drawingml/2006/main" xmlns:r="http://schemas.openxmlformats.org/officeDocument/2006/relationships" xmlns:p="http://schemas.openxmlformats.org/presentationml/2006/main">
-  <p:cSld>
-    <p:spTree>
-      <p:nvGrpSpPr>
-        <p:cNvPr id="1" name=""/>
-        <p:cNvGrpSpPr/>
-        <p:nvPr/>
-      </p:nvGrpSpPr>
-      <p:grpSpPr>
-        <a:xfrm>
-          <a:off x="0" y="0"/>
-          <a:ext cx="0" cy="0"/>
-          <a:chOff x="0" y="0"/>
-          <a:chExt cx="0" cy="0"/>
-        </a:xfrm>
-      </p:grpSpPr>
-      <p:sp>
-        <p:nvSpPr>
-          <p:cNvPr id="2" name="Tytuł 1"/>
-          <p:cNvSpPr>
-            <a:spLocks noGrp="1"/>
-          </p:cNvSpPr>
-          <p:nvPr>
-            <p:ph type="title"/>
-          </p:nvPr>
-        </p:nvSpPr>
-        <p:spPr>
-          <a:xfrm>
-            <a:off x="344032" y="205214"/>
-            <a:ext cx="9232562" cy="1505890"/>
-          </a:xfrm>
-        </p:spPr>
-        <p:txBody>
-          <a:bodyPr/>
-          <a:lstStyle/>
-          <a:p>
-            <a:r>
-              <a:rPr lang="pl-PL" dirty="0"/>
-              <a:t>Proces wytwarzania oprogramowania</a:t>
-            </a:r>
-          </a:p>
-        </p:txBody>
-      </p:sp>
-      <p:sp>
-        <p:nvSpPr>
-          <p:cNvPr id="3" name="Symbol zastępczy zawartości 2"/>
-          <p:cNvSpPr>
-            <a:spLocks noGrp="1"/>
-          </p:cNvSpPr>
-          <p:nvPr>
-            <p:ph idx="1"/>
-          </p:nvPr>
-        </p:nvSpPr>
-        <p:spPr>
-          <a:xfrm>
-            <a:off x="688063" y="1430449"/>
-            <a:ext cx="9297909" cy="6129226"/>
-          </a:xfrm>
-        </p:spPr>
-        <p:txBody>
-          <a:bodyPr>
-            <a:normAutofit/>
-          </a:bodyPr>
-          <a:lstStyle/>
-          <a:p>
-            <a:pPr lvl="0"/>
-            <a:r>
-              <a:rPr lang="pl-PL" dirty="0" smtClean="0"/>
-              <a:t>Sprint </a:t>
-            </a:r>
-            <a:r>
-              <a:rPr lang="pl-PL" dirty="0"/>
-              <a:t>trwa 14 dni,</a:t>
-            </a:r>
-          </a:p>
-          <a:p>
-            <a:pPr lvl="0"/>
-            <a:r>
-              <a:rPr lang="pl-PL" dirty="0" smtClean="0"/>
-              <a:t>Sprint </a:t>
-            </a:r>
-            <a:r>
-              <a:rPr lang="pl-PL" dirty="0"/>
-              <a:t>rozpoczyna się spotkaniem planistycznym w którym uczestniczy cały Zespól </a:t>
-            </a:r>
-            <a:r>
-              <a:rPr lang="pl-PL" dirty="0" err="1" smtClean="0"/>
-              <a:t>Scrumowy</a:t>
-            </a:r>
-            <a:endParaRPr lang="pl-PL" dirty="0"/>
-          </a:p>
-          <a:p>
-            <a:r>
-              <a:rPr lang="pl-PL" dirty="0" smtClean="0"/>
-              <a:t>Zespól </a:t>
-            </a:r>
-            <a:r>
-              <a:rPr lang="pl-PL" dirty="0"/>
-              <a:t>deweloperski codziennie uczestniczy w </a:t>
-            </a:r>
-            <a:r>
-              <a:rPr lang="pl-PL" dirty="0" err="1"/>
-              <a:t>Daily</a:t>
-            </a:r>
-            <a:r>
-              <a:rPr lang="pl-PL" dirty="0"/>
-              <a:t> </a:t>
-            </a:r>
-            <a:r>
-              <a:rPr lang="pl-PL" dirty="0" err="1"/>
-              <a:t>Standupie</a:t>
-            </a:r>
-            <a:endParaRPr lang="pl-PL" dirty="0"/>
-          </a:p>
-          <a:p>
-            <a:pPr lvl="0"/>
-            <a:r>
-              <a:rPr lang="pl-PL" dirty="0" smtClean="0"/>
-              <a:t>W </a:t>
-            </a:r>
-            <a:r>
-              <a:rPr lang="pl-PL" dirty="0"/>
-              <a:t>każdą środę </a:t>
-            </a:r>
-            <a:r>
-              <a:rPr lang="pl-PL" dirty="0" smtClean="0"/>
-              <a:t>zespół </a:t>
-            </a:r>
-            <a:r>
-              <a:rPr lang="pl-PL" dirty="0"/>
-              <a:t>deweloperski spotyka się z Product </a:t>
-            </a:r>
-            <a:r>
-              <a:rPr lang="pl-PL" dirty="0" err="1" smtClean="0"/>
-              <a:t>Owner</a:t>
-            </a:r>
-            <a:r>
-              <a:rPr lang="pl-PL" dirty="0" smtClean="0"/>
-              <a:t>-em </a:t>
-            </a:r>
-            <a:r>
-              <a:rPr lang="pl-PL" dirty="0"/>
-              <a:t>i estymuje karty w Product </a:t>
-            </a:r>
-            <a:r>
-              <a:rPr lang="pl-PL" dirty="0" err="1" smtClean="0"/>
-              <a:t>Backlogu</a:t>
-            </a:r>
-            <a:endParaRPr lang="pl-PL" dirty="0"/>
-          </a:p>
-          <a:p>
-            <a:pPr lvl="0"/>
-            <a:r>
-              <a:rPr lang="pl-PL" dirty="0" smtClean="0"/>
-              <a:t>Sprint </a:t>
-            </a:r>
-            <a:r>
-              <a:rPr lang="pl-PL" dirty="0"/>
-              <a:t>kończy się spotkaniem podczas którego zespól prezentuje funkcjonalności przyrostu iteracji wszystkim interesariuszom (spotkanie demo) i retrospektywą zespołu w swoim zamkniętym gronie.</a:t>
-            </a:r>
-          </a:p>
-          <a:p>
-            <a:endParaRPr lang="pl-PL" dirty="0"/>
-          </a:p>
-        </p:txBody>
-      </p:sp>
-    </p:spTree>
-    <p:extLst>
-      <p:ext uri="{BB962C8B-B14F-4D97-AF65-F5344CB8AC3E}">
-        <p14:creationId xmlns:p14="http://schemas.microsoft.com/office/powerpoint/2010/main" val="3112259209"/>
-      </p:ext>
-    </p:extLst>
-  </p:cSld>
-  <p:clrMapOvr>
-    <a:masterClrMapping/>
-  </p:clrMapOvr>
-</p:sld>
-</file>
-
-<file path=ppt/slides/slide8.xml><?xml version="1.0" encoding="utf-8"?>
-<p:sld xmlns:a="http://schemas.openxmlformats.org/drawingml/2006/main" xmlns:r="http://schemas.openxmlformats.org/officeDocument/2006/relationships" xmlns:p="http://schemas.openxmlformats.org/presentationml/2006/main">
-  <p:cSld>
-    <p:spTree>
-      <p:nvGrpSpPr>
-        <p:cNvPr id="1" name=""/>
-        <p:cNvGrpSpPr/>
-        <p:nvPr/>
-      </p:nvGrpSpPr>
-      <p:grpSpPr>
-        <a:xfrm>
-          <a:off x="0" y="0"/>
-          <a:ext cx="0" cy="0"/>
-          <a:chOff x="0" y="0"/>
-          <a:chExt cx="0" cy="0"/>
-        </a:xfrm>
-      </p:grpSpPr>
-      <p:sp>
-        <p:nvSpPr>
-          <p:cNvPr id="2" name="Tytuł 1"/>
-          <p:cNvSpPr>
-            <a:spLocks noGrp="1"/>
-          </p:cNvSpPr>
-          <p:nvPr>
-            <p:ph type="title"/>
-          </p:nvPr>
-        </p:nvSpPr>
-        <p:spPr/>
-        <p:txBody>
-          <a:bodyPr/>
-          <a:lstStyle/>
-          <a:p>
-            <a:r>
-              <a:rPr lang="pl-PL" dirty="0" smtClean="0"/>
-              <a:t>Git-</a:t>
-            </a:r>
-            <a:r>
-              <a:rPr lang="pl-PL" dirty="0" err="1"/>
-              <a:t>F</a:t>
-            </a:r>
-            <a:r>
-              <a:rPr lang="pl-PL" dirty="0" err="1" smtClean="0"/>
-              <a:t>low</a:t>
-            </a:r>
-            <a:endParaRPr lang="pl-PL" dirty="0"/>
-          </a:p>
-        </p:txBody>
-      </p:sp>
-      <p:pic>
-        <p:nvPicPr>
-          <p:cNvPr id="6" name="Symbol zastępczy zawartości 5"/>
-          <p:cNvPicPr>
-            <a:picLocks noGrp="1" noChangeAspect="1"/>
-          </p:cNvPicPr>
-          <p:nvPr>
-            <p:ph idx="1"/>
-          </p:nvPr>
-        </p:nvPicPr>
-        <p:blipFill>
-          <a:blip r:embed="rId2"/>
-          <a:stretch>
-            <a:fillRect/>
-          </a:stretch>
-        </p:blipFill>
-        <p:spPr>
-          <a:xfrm>
-            <a:off x="24256" y="2561751"/>
-            <a:ext cx="10056370" cy="2712228"/>
-          </a:xfrm>
-          <a:prstGeom prst="rect">
-            <a:avLst/>
-          </a:prstGeom>
-        </p:spPr>
-      </p:pic>
-    </p:spTree>
-    <p:extLst>
-      <p:ext uri="{BB962C8B-B14F-4D97-AF65-F5344CB8AC3E}">
-        <p14:creationId xmlns:p14="http://schemas.microsoft.com/office/powerpoint/2010/main" val="137131490"/>
-      </p:ext>
-    </p:extLst>
-  </p:cSld>
-  <p:clrMapOvr>
-    <a:masterClrMapping/>
-  </p:clrMapOvr>
+  <p:timing>
+    <p:tnLst>
+      <p:par>
+        <p:cTn id="1" dur="indefinite" restart="never" nodeType="tmRoot"/>
+      </p:par>
+    </p:tnLst>
+  </p:timing>
 </p:sld>
 </file>
 
@@ -12237,71 +13930,132 @@
       </p:grpSpPr>
       <p:sp>
         <p:nvSpPr>
-          <p:cNvPr id="110" name="CustomShape 1"/>
-          <p:cNvSpPr/>
-          <p:nvPr/>
+          <p:cNvPr id="2" name="Tytuł 1"/>
+          <p:cNvSpPr>
+            <a:spLocks noGrp="1"/>
+          </p:cNvSpPr>
+          <p:nvPr>
+            <p:ph type="title"/>
+          </p:nvPr>
         </p:nvSpPr>
         <p:spPr>
           <a:xfrm>
-            <a:off x="216000" y="2880000"/>
-            <a:ext cx="9071280" cy="1261800"/>
+            <a:off x="235390" y="368177"/>
+            <a:ext cx="9723421" cy="2183906"/>
           </a:xfrm>
-          <a:prstGeom prst="rect">
-            <a:avLst/>
-          </a:prstGeom>
-          <a:noFill/>
-          <a:ln>
-            <a:noFill/>
-          </a:ln>
         </p:spPr>
-        <p:style>
-          <a:lnRef idx="0">
-            <a:scrgbClr r="0" g="0" b="0"/>
-          </a:lnRef>
-          <a:fillRef idx="0">
-            <a:scrgbClr r="0" g="0" b="0"/>
-          </a:fillRef>
-          <a:effectRef idx="0">
-            <a:scrgbClr r="0" g="0" b="0"/>
-          </a:effectRef>
-          <a:fontRef idx="minor"/>
-        </p:style>
         <p:txBody>
-          <a:bodyPr lIns="0" tIns="0" rIns="0" bIns="0" anchor="ctr"/>
+          <a:bodyPr/>
           <a:lstStyle/>
           <a:p>
-            <a:pPr algn="ctr">
-              <a:lnSpc>
-                <a:spcPct val="100000"/>
-              </a:lnSpc>
-            </a:pPr>
-            <a:r>
-              <a:rPr lang="pl-PL" sz="6000" strike="noStrike" spc="-1">
-                <a:uFill>
-                  <a:solidFill>
-                    <a:srgbClr val="FFFFFF"/>
-                  </a:solidFill>
-                </a:uFill>
-                <a:latin typeface="Arial"/>
-              </a:rPr>
-              <a:t>REST API autentykacja</a:t>
-            </a:r>
-            <a:r>
-              <a:rPr lang="pl-PL" sz="4400" strike="noStrike" spc="-1">
-                <a:uFill>
-                  <a:solidFill>
-                    <a:srgbClr val="FFFFFF"/>
-                  </a:solidFill>
-                </a:uFill>
-                <a:latin typeface="Arial"/>
-              </a:rPr>
+            <a:r>
+              <a:rPr lang="pl-PL" dirty="0"/>
+              <a:t>W ramach poszczególnych kart </a:t>
+            </a:r>
+            <a:r>
+              <a:rPr lang="pl-PL" dirty="0" smtClean="0"/>
+              <a:t>możemy:</a:t>
+            </a:r>
+            <a:r>
+              <a:rPr lang="pl-PL" dirty="0"/>
+              <a:t/>
+            </a:r>
+            <a:br>
+              <a:rPr lang="pl-PL" dirty="0"/>
+            </a:br>
+            <a:endParaRPr lang="pl-PL" dirty="0"/>
+          </a:p>
+        </p:txBody>
+      </p:sp>
+      <p:sp>
+        <p:nvSpPr>
+          <p:cNvPr id="3" name="Symbol zastępczy zawartości 2"/>
+          <p:cNvSpPr>
+            <a:spLocks noGrp="1"/>
+          </p:cNvSpPr>
+          <p:nvPr>
+            <p:ph idx="1"/>
+          </p:nvPr>
+        </p:nvSpPr>
+        <p:spPr>
+          <a:xfrm>
+            <a:off x="1082734" y="1901228"/>
+            <a:ext cx="8493860" cy="4712458"/>
+          </a:xfrm>
+        </p:spPr>
+        <p:txBody>
+          <a:bodyPr>
+            <a:normAutofit/>
+          </a:bodyPr>
+          <a:lstStyle/>
+          <a:p>
+            <a:r>
+              <a:rPr lang="pl-PL" dirty="0" smtClean="0"/>
+              <a:t>dodać </a:t>
+            </a:r>
+            <a:r>
+              <a:rPr lang="pl-PL" dirty="0"/>
+              <a:t>opis</a:t>
+            </a:r>
+          </a:p>
+          <a:p>
+            <a:r>
+              <a:rPr lang="pl-PL" dirty="0"/>
+              <a:t>napisać komentarz</a:t>
+            </a:r>
+          </a:p>
+          <a:p>
+            <a:r>
+              <a:rPr lang="pl-PL" dirty="0"/>
+              <a:t>tagować za pomocą kolorów i krótkich opisów</a:t>
+            </a:r>
+          </a:p>
+          <a:p>
+            <a:r>
+              <a:rPr lang="pl-PL" dirty="0"/>
+              <a:t>określać termin (deadline)</a:t>
+            </a:r>
+          </a:p>
+          <a:p>
+            <a:r>
+              <a:rPr lang="pl-PL" dirty="0"/>
+              <a:t>głosować na daną kartę</a:t>
+            </a:r>
+          </a:p>
+          <a:p>
+            <a:r>
+              <a:rPr lang="pl-PL" dirty="0"/>
+              <a:t>dodawać </a:t>
+            </a:r>
+            <a:r>
+              <a:rPr lang="pl-PL" dirty="0" err="1" smtClean="0"/>
+              <a:t>checklisty</a:t>
+            </a:r>
+            <a:r>
+              <a:rPr lang="pl-PL" dirty="0" smtClean="0"/>
               <a:t> </a:t>
             </a:r>
-            <a:endParaRPr/>
+            <a:r>
+              <a:rPr lang="pl-PL" dirty="0"/>
+              <a:t>oraz pliki pochodzące bezpośrednio z naszego komputera, jak i serwisów takich jak </a:t>
+            </a:r>
+            <a:r>
+              <a:rPr lang="pl-PL" i="1" dirty="0" err="1"/>
+              <a:t>Dropbox</a:t>
+            </a:r>
+            <a:endParaRPr lang="pl-PL" i="1" dirty="0"/>
+          </a:p>
+          <a:p>
+            <a:endParaRPr lang="pl-PL" dirty="0"/>
           </a:p>
         </p:txBody>
       </p:sp>
     </p:spTree>
+    <p:extLst>
+      <p:ext uri="{BB962C8B-B14F-4D97-AF65-F5344CB8AC3E}">
+        <p14:creationId xmlns:p14="http://schemas.microsoft.com/office/powerpoint/2010/main" val="117598279"/>
+      </p:ext>
+    </p:extLst>
   </p:cSld>
   <p:clrMapOvr>
     <a:masterClrMapping/>
@@ -12309,27 +14063,7 @@
   <p:timing>
     <p:tnLst>
       <p:par>
-        <p:cTn id="1" dur="indefinite" restart="never" nodeType="tmRoot">
-          <p:childTnLst>
-            <p:seq>
-              <p:cTn id="2" nodeType="mainSeq"/>
-              <p:prevCondLst>
-                <p:cond evt="onPrev" delay="0">
-                  <p:tgtEl>
-                    <p:sldTgt/>
-                  </p:tgtEl>
-                </p:cond>
-              </p:prevCondLst>
-              <p:nextCondLst>
-                <p:cond evt="onNext" delay="0">
-                  <p:tgtEl>
-                    <p:sldTgt/>
-                  </p:tgtEl>
-                </p:cond>
-              </p:nextCondLst>
-            </p:seq>
-          </p:childTnLst>
-        </p:cTn>
+        <p:cTn id="1" dur="indefinite" restart="never" nodeType="tmRoot"/>
       </p:par>
     </p:tnLst>
   </p:timing>
@@ -12590,4 +14324,265 @@
     </a:ext>
   </a:extLst>
 </a:theme>
+</file>
+
+<file path=ppt/theme/theme2.xml><?xml version="1.0" encoding="utf-8"?>
+<a:theme xmlns:a="http://schemas.openxmlformats.org/drawingml/2006/main" name="Motyw pakietu Office">
+  <a:themeElements>
+    <a:clrScheme name="Pakiet Office">
+      <a:dk1>
+        <a:sysClr val="windowText" lastClr="000000"/>
+      </a:dk1>
+      <a:lt1>
+        <a:sysClr val="window" lastClr="FFFFFF"/>
+      </a:lt1>
+      <a:dk2>
+        <a:srgbClr val="44546A"/>
+      </a:dk2>
+      <a:lt2>
+        <a:srgbClr val="E7E6E6"/>
+      </a:lt2>
+      <a:accent1>
+        <a:srgbClr val="5B9BD5"/>
+      </a:accent1>
+      <a:accent2>
+        <a:srgbClr val="ED7D31"/>
+      </a:accent2>
+      <a:accent3>
+        <a:srgbClr val="A5A5A5"/>
+      </a:accent3>
+      <a:accent4>
+        <a:srgbClr val="FFC000"/>
+      </a:accent4>
+      <a:accent5>
+        <a:srgbClr val="4472C4"/>
+      </a:accent5>
+      <a:accent6>
+        <a:srgbClr val="70AD47"/>
+      </a:accent6>
+      <a:hlink>
+        <a:srgbClr val="0563C1"/>
+      </a:hlink>
+      <a:folHlink>
+        <a:srgbClr val="954F72"/>
+      </a:folHlink>
+    </a:clrScheme>
+    <a:fontScheme name="Pakiet Office">
+      <a:majorFont>
+        <a:latin typeface="Calibri Light" panose="020F0302020204030204"/>
+        <a:ea typeface=""/>
+        <a:cs typeface=""/>
+        <a:font script="Jpan" typeface="ＭＳ Ｐゴシック"/>
+        <a:font script="Hang" typeface="맑은 고딕"/>
+        <a:font script="Hans" typeface="宋体"/>
+        <a:font script="Hant" typeface="新細明體"/>
+        <a:font script="Arab" typeface="Times New Roman"/>
+        <a:font script="Hebr" typeface="Times New Roman"/>
+        <a:font script="Thai" typeface="Angsana New"/>
+        <a:font script="Ethi" typeface="Nyala"/>
+        <a:font script="Beng" typeface="Vrinda"/>
+        <a:font script="Gujr" typeface="Shruti"/>
+        <a:font script="Khmr" typeface="MoolBoran"/>
+        <a:font script="Knda" typeface="Tunga"/>
+        <a:font script="Guru" typeface="Raavi"/>
+        <a:font script="Cans" typeface="Euphemia"/>
+        <a:font script="Cher" typeface="Plantagenet Cherokee"/>
+        <a:font script="Yiii" typeface="Microsoft Yi Baiti"/>
+        <a:font script="Tibt" typeface="Microsoft Himalaya"/>
+        <a:font script="Thaa" typeface="MV Boli"/>
+        <a:font script="Deva" typeface="Mangal"/>
+        <a:font script="Telu" typeface="Gautami"/>
+        <a:font script="Taml" typeface="Latha"/>
+        <a:font script="Syrc" typeface="Estrangelo Edessa"/>
+        <a:font script="Orya" typeface="Kalinga"/>
+        <a:font script="Mlym" typeface="Kartika"/>
+        <a:font script="Laoo" typeface="DokChampa"/>
+        <a:font script="Sinh" typeface="Iskoola Pota"/>
+        <a:font script="Mong" typeface="Mongolian Baiti"/>
+        <a:font script="Viet" typeface="Times New Roman"/>
+        <a:font script="Uigh" typeface="Microsoft Uighur"/>
+        <a:font script="Geor" typeface="Sylfaen"/>
+      </a:majorFont>
+      <a:minorFont>
+        <a:latin typeface="Calibri" panose="020F0502020204030204"/>
+        <a:ea typeface=""/>
+        <a:cs typeface=""/>
+        <a:font script="Jpan" typeface="ＭＳ Ｐゴシック"/>
+        <a:font script="Hang" typeface="맑은 고딕"/>
+        <a:font script="Hans" typeface="宋体"/>
+        <a:font script="Hant" typeface="新細明體"/>
+        <a:font script="Arab" typeface="Arial"/>
+        <a:font script="Hebr" typeface="Arial"/>
+        <a:font script="Thai" typeface="Cordia New"/>
+        <a:font script="Ethi" typeface="Nyala"/>
+        <a:font script="Beng" typeface="Vrinda"/>
+        <a:font script="Gujr" typeface="Shruti"/>
+        <a:font script="Khmr" typeface="DaunPenh"/>
+        <a:font script="Knda" typeface="Tunga"/>
+        <a:font script="Guru" typeface="Raavi"/>
+        <a:font script="Cans" typeface="Euphemia"/>
+        <a:font script="Cher" typeface="Plantagenet Cherokee"/>
+        <a:font script="Yiii" typeface="Microsoft Yi Baiti"/>
+        <a:font script="Tibt" typeface="Microsoft Himalaya"/>
+        <a:font script="Thaa" typeface="MV Boli"/>
+        <a:font script="Deva" typeface="Mangal"/>
+        <a:font script="Telu" typeface="Gautami"/>
+        <a:font script="Taml" typeface="Latha"/>
+        <a:font script="Syrc" typeface="Estrangelo Edessa"/>
+        <a:font script="Orya" typeface="Kalinga"/>
+        <a:font script="Mlym" typeface="Kartika"/>
+        <a:font script="Laoo" typeface="DokChampa"/>
+        <a:font script="Sinh" typeface="Iskoola Pota"/>
+        <a:font script="Mong" typeface="Mongolian Baiti"/>
+        <a:font script="Viet" typeface="Arial"/>
+        <a:font script="Uigh" typeface="Microsoft Uighur"/>
+        <a:font script="Geor" typeface="Sylfaen"/>
+      </a:minorFont>
+    </a:fontScheme>
+    <a:fmtScheme name="Pakiet Office">
+      <a:fillStyleLst>
+        <a:solidFill>
+          <a:schemeClr val="phClr"/>
+        </a:solidFill>
+        <a:gradFill rotWithShape="1">
+          <a:gsLst>
+            <a:gs pos="0">
+              <a:schemeClr val="phClr">
+                <a:lumMod val="110000"/>
+                <a:satMod val="105000"/>
+                <a:tint val="67000"/>
+              </a:schemeClr>
+            </a:gs>
+            <a:gs pos="50000">
+              <a:schemeClr val="phClr">
+                <a:lumMod val="105000"/>
+                <a:satMod val="103000"/>
+                <a:tint val="73000"/>
+              </a:schemeClr>
+            </a:gs>
+            <a:gs pos="100000">
+              <a:schemeClr val="phClr">
+                <a:lumMod val="105000"/>
+                <a:satMod val="109000"/>
+                <a:tint val="81000"/>
+              </a:schemeClr>
+            </a:gs>
+          </a:gsLst>
+          <a:lin ang="5400000" scaled="0"/>
+        </a:gradFill>
+        <a:gradFill rotWithShape="1">
+          <a:gsLst>
+            <a:gs pos="0">
+              <a:schemeClr val="phClr">
+                <a:satMod val="103000"/>
+                <a:lumMod val="102000"/>
+                <a:tint val="94000"/>
+              </a:schemeClr>
+            </a:gs>
+            <a:gs pos="50000">
+              <a:schemeClr val="phClr">
+                <a:satMod val="110000"/>
+                <a:lumMod val="100000"/>
+                <a:shade val="100000"/>
+              </a:schemeClr>
+            </a:gs>
+            <a:gs pos="100000">
+              <a:schemeClr val="phClr">
+                <a:lumMod val="99000"/>
+                <a:satMod val="120000"/>
+                <a:shade val="78000"/>
+              </a:schemeClr>
+            </a:gs>
+          </a:gsLst>
+          <a:lin ang="5400000" scaled="0"/>
+        </a:gradFill>
+      </a:fillStyleLst>
+      <a:lnStyleLst>
+        <a:ln w="6350" cap="flat" cmpd="sng" algn="ctr">
+          <a:solidFill>
+            <a:schemeClr val="phClr"/>
+          </a:solidFill>
+          <a:prstDash val="solid"/>
+          <a:miter lim="800000"/>
+        </a:ln>
+        <a:ln w="12700" cap="flat" cmpd="sng" algn="ctr">
+          <a:solidFill>
+            <a:schemeClr val="phClr"/>
+          </a:solidFill>
+          <a:prstDash val="solid"/>
+          <a:miter lim="800000"/>
+        </a:ln>
+        <a:ln w="19050" cap="flat" cmpd="sng" algn="ctr">
+          <a:solidFill>
+            <a:schemeClr val="phClr"/>
+          </a:solidFill>
+          <a:prstDash val="solid"/>
+          <a:miter lim="800000"/>
+        </a:ln>
+      </a:lnStyleLst>
+      <a:effectStyleLst>
+        <a:effectStyle>
+          <a:effectLst/>
+        </a:effectStyle>
+        <a:effectStyle>
+          <a:effectLst/>
+        </a:effectStyle>
+        <a:effectStyle>
+          <a:effectLst>
+            <a:outerShdw blurRad="57150" dist="19050" dir="5400000" algn="ctr" rotWithShape="0">
+              <a:srgbClr val="000000">
+                <a:alpha val="63000"/>
+              </a:srgbClr>
+            </a:outerShdw>
+          </a:effectLst>
+        </a:effectStyle>
+      </a:effectStyleLst>
+      <a:bgFillStyleLst>
+        <a:solidFill>
+          <a:schemeClr val="phClr"/>
+        </a:solidFill>
+        <a:solidFill>
+          <a:schemeClr val="phClr">
+            <a:tint val="95000"/>
+            <a:satMod val="170000"/>
+          </a:schemeClr>
+        </a:solidFill>
+        <a:gradFill rotWithShape="1">
+          <a:gsLst>
+            <a:gs pos="0">
+              <a:schemeClr val="phClr">
+                <a:tint val="93000"/>
+                <a:satMod val="150000"/>
+                <a:shade val="98000"/>
+                <a:lumMod val="102000"/>
+              </a:schemeClr>
+            </a:gs>
+            <a:gs pos="50000">
+              <a:schemeClr val="phClr">
+                <a:tint val="98000"/>
+                <a:satMod val="130000"/>
+                <a:shade val="90000"/>
+                <a:lumMod val="103000"/>
+              </a:schemeClr>
+            </a:gs>
+            <a:gs pos="100000">
+              <a:schemeClr val="phClr">
+                <a:shade val="63000"/>
+                <a:satMod val="120000"/>
+              </a:schemeClr>
+            </a:gs>
+          </a:gsLst>
+          <a:lin ang="5400000" scaled="0"/>
+        </a:gradFill>
+      </a:bgFillStyleLst>
+    </a:fmtScheme>
+  </a:themeElements>
+  <a:objectDefaults/>
+  <a:extraClrSchemeLst/>
+  <a:extLst>
+    <a:ext uri="{05A4C25C-085E-4340-85A3-A5531E510DB2}">
+      <thm15:themeFamily xmlns:thm15="http://schemas.microsoft.com/office/thememl/2012/main" name="Office Theme" id="{62F939B6-93AF-4DB8-9C6B-D6C7DFDC589F}" vid="{4A3C46E8-61CC-4603-A589-7422A47A8E4A}"/>
+    </a:ext>
+  </a:extLst>
+</a:theme>
 </file>
</xml_diff>